<commit_message>
Update Session 19 - Managing Power BI using the Power BI Admin APIs.pptx
</commit_message>
<xml_diff>
--- a/Session 19 - Managing Power BI using the Power BI Admin APIs.pptx
+++ b/Session 19 - Managing Power BI using the Power BI Admin APIs.pptx
@@ -5,17 +5,47 @@
     <p:sldMasterId id="2147484551" r:id="rId4"/>
   </p:sldMasterIdLst>
   <p:notesMasterIdLst>
-    <p:notesMasterId r:id="rId10"/>
+    <p:notesMasterId r:id="rId40"/>
   </p:notesMasterIdLst>
   <p:handoutMasterIdLst>
-    <p:handoutMasterId r:id="rId11"/>
+    <p:handoutMasterId r:id="rId41"/>
   </p:handoutMasterIdLst>
   <p:sldIdLst>
     <p:sldId id="4474" r:id="rId5"/>
     <p:sldId id="4475" r:id="rId6"/>
     <p:sldId id="4483" r:id="rId7"/>
     <p:sldId id="2076138576" r:id="rId8"/>
-    <p:sldId id="4505" r:id="rId9"/>
+    <p:sldId id="2076138613" r:id="rId9"/>
+    <p:sldId id="2076138595" r:id="rId10"/>
+    <p:sldId id="2076138594" r:id="rId11"/>
+    <p:sldId id="2076138602" r:id="rId12"/>
+    <p:sldId id="2076138577" r:id="rId13"/>
+    <p:sldId id="2076138615" r:id="rId14"/>
+    <p:sldId id="2076138578" r:id="rId15"/>
+    <p:sldId id="2076138591" r:id="rId16"/>
+    <p:sldId id="2076138579" r:id="rId17"/>
+    <p:sldId id="2076138581" r:id="rId18"/>
+    <p:sldId id="2076138580" r:id="rId19"/>
+    <p:sldId id="2076138592" r:id="rId20"/>
+    <p:sldId id="2076138603" r:id="rId21"/>
+    <p:sldId id="2076138584" r:id="rId22"/>
+    <p:sldId id="2076138618" r:id="rId23"/>
+    <p:sldId id="2076138583" r:id="rId24"/>
+    <p:sldId id="2076138582" r:id="rId25"/>
+    <p:sldId id="2076138586" r:id="rId26"/>
+    <p:sldId id="2076138585" r:id="rId27"/>
+    <p:sldId id="2076138608" r:id="rId28"/>
+    <p:sldId id="2076138604" r:id="rId29"/>
+    <p:sldId id="2076138587" r:id="rId30"/>
+    <p:sldId id="2076138588" r:id="rId31"/>
+    <p:sldId id="2076138605" r:id="rId32"/>
+    <p:sldId id="2076138606" r:id="rId33"/>
+    <p:sldId id="2076138589" r:id="rId34"/>
+    <p:sldId id="2076138617" r:id="rId35"/>
+    <p:sldId id="2076138609" r:id="rId36"/>
+    <p:sldId id="2076138614" r:id="rId37"/>
+    <p:sldId id="2076138607" r:id="rId38"/>
+    <p:sldId id="4505" r:id="rId39"/>
   </p:sldIdLst>
   <p:sldSz cx="12436475" cy="6994525"/>
   <p:notesSz cx="7010400" cy="9296400"/>
@@ -455,7 +485,7 @@
           <a:p>
             <a:fld id="{DCE60099-03E7-4FA1-8A7F-E6E6CFB0F855}" type="datetime8">
               <a:rPr lang="en-US" smtClean="0"/>
-              <a:t>1/12/2022 12:38 PM</a:t>
+              <a:t>2/1/2022 8:57 AM</a:t>
             </a:fld>
             <a:endParaRPr lang="en-US"/>
           </a:p>
@@ -1107,7 +1137,7 @@
             <a:fld id="{B4008EB6-D09E-4580-8CD6-DDB14511944F}" type="slidenum">
               <a:rPr lang="en-US" smtClean="0"/>
               <a:pPr/>
-              <a:t>5</a:t>
+              <a:t>35</a:t>
             </a:fld>
             <a:endParaRPr lang="en-US"/>
           </a:p>
@@ -3548,6 +3578,1021 @@
 </p:sld>
 </file>
 
+<file path=ppt/slides/slide10.xml><?xml version="1.0" encoding="utf-8"?>
+<p:sld xmlns:a="http://schemas.openxmlformats.org/drawingml/2006/main" xmlns:r="http://schemas.openxmlformats.org/officeDocument/2006/relationships" xmlns:p="http://schemas.openxmlformats.org/presentationml/2006/main">
+  <p:cSld>
+    <p:spTree>
+      <p:nvGrpSpPr>
+        <p:cNvPr id="1" name=""/>
+        <p:cNvGrpSpPr/>
+        <p:nvPr/>
+      </p:nvGrpSpPr>
+      <p:grpSpPr>
+        <a:xfrm>
+          <a:off x="0" y="0"/>
+          <a:ext cx="0" cy="0"/>
+          <a:chOff x="0" y="0"/>
+          <a:chExt cx="0" cy="0"/>
+        </a:xfrm>
+      </p:grpSpPr>
+      <p:sp>
+        <p:nvSpPr>
+          <p:cNvPr id="2" name="Title 1">
+            <a:extLst>
+              <a:ext uri="{FF2B5EF4-FFF2-40B4-BE49-F238E27FC236}">
+                <a16:creationId xmlns:a16="http://schemas.microsoft.com/office/drawing/2014/main" id="{19D5BC63-3425-47AA-A76C-EBD13AD00DBB}"/>
+              </a:ext>
+            </a:extLst>
+          </p:cNvPr>
+          <p:cNvSpPr>
+            <a:spLocks noGrp="1"/>
+          </p:cNvSpPr>
+          <p:nvPr>
+            <p:ph type="title"/>
+          </p:nvPr>
+        </p:nvSpPr>
+        <p:spPr/>
+        <p:txBody>
+          <a:bodyPr/>
+          <a:lstStyle/>
+          <a:p>
+            <a:r>
+              <a:rPr lang="en-US" dirty="0"/>
+              <a:t>Managing Workspace Membership</a:t>
+            </a:r>
+          </a:p>
+        </p:txBody>
+      </p:sp>
+      <p:sp>
+        <p:nvSpPr>
+          <p:cNvPr id="3" name="Text Placeholder 2">
+            <a:extLst>
+              <a:ext uri="{FF2B5EF4-FFF2-40B4-BE49-F238E27FC236}">
+                <a16:creationId xmlns:a16="http://schemas.microsoft.com/office/drawing/2014/main" id="{B8264A6C-8CB3-4276-A205-F9554DF62B2B}"/>
+              </a:ext>
+            </a:extLst>
+          </p:cNvPr>
+          <p:cNvSpPr>
+            <a:spLocks noGrp="1"/>
+          </p:cNvSpPr>
+          <p:nvPr>
+            <p:ph type="body" sz="quarter" idx="10"/>
+          </p:nvPr>
+        </p:nvSpPr>
+        <p:spPr>
+          <a:xfrm>
+            <a:off x="511277" y="1227439"/>
+            <a:ext cx="11604521" cy="2069797"/>
+          </a:xfrm>
+        </p:spPr>
+        <p:txBody>
+          <a:bodyPr/>
+          <a:lstStyle/>
+          <a:p>
+            <a:r>
+              <a:rPr lang="en-US" dirty="0" err="1"/>
+              <a:t>GetGroupUsersAsAdmin</a:t>
+            </a:r>
+            <a:endParaRPr lang="en-US" dirty="0"/>
+          </a:p>
+          <a:p>
+            <a:r>
+              <a:rPr lang="en-US" dirty="0" err="1"/>
+              <a:t>AddUserAsAdmin</a:t>
+            </a:r>
+            <a:endParaRPr lang="en-US" dirty="0"/>
+          </a:p>
+          <a:p>
+            <a:r>
+              <a:rPr lang="en-US" dirty="0" err="1"/>
+              <a:t>DeleteUserAsAdmin</a:t>
+            </a:r>
+            <a:endParaRPr lang="en-US" dirty="0"/>
+          </a:p>
+          <a:p>
+            <a:endParaRPr lang="en-US" dirty="0"/>
+          </a:p>
+        </p:txBody>
+      </p:sp>
+    </p:spTree>
+    <p:extLst>
+      <p:ext uri="{BB962C8B-B14F-4D97-AF65-F5344CB8AC3E}">
+        <p14:creationId xmlns:p14="http://schemas.microsoft.com/office/powerpoint/2010/main" val="1830211467"/>
+      </p:ext>
+    </p:extLst>
+  </p:cSld>
+  <p:clrMapOvr>
+    <a:masterClrMapping/>
+  </p:clrMapOvr>
+  <p:transition>
+    <p:fade/>
+  </p:transition>
+</p:sld>
+</file>
+
+<file path=ppt/slides/slide11.xml><?xml version="1.0" encoding="utf-8"?>
+<p:sld xmlns:a="http://schemas.openxmlformats.org/drawingml/2006/main" xmlns:r="http://schemas.openxmlformats.org/officeDocument/2006/relationships" xmlns:p="http://schemas.openxmlformats.org/presentationml/2006/main">
+  <p:cSld>
+    <p:spTree>
+      <p:nvGrpSpPr>
+        <p:cNvPr id="1" name=""/>
+        <p:cNvGrpSpPr/>
+        <p:nvPr/>
+      </p:nvGrpSpPr>
+      <p:grpSpPr>
+        <a:xfrm>
+          <a:off x="0" y="0"/>
+          <a:ext cx="0" cy="0"/>
+          <a:chOff x="0" y="0"/>
+          <a:chExt cx="0" cy="0"/>
+        </a:xfrm>
+      </p:grpSpPr>
+      <p:sp>
+        <p:nvSpPr>
+          <p:cNvPr id="2" name="Title 1">
+            <a:extLst>
+              <a:ext uri="{FF2B5EF4-FFF2-40B4-BE49-F238E27FC236}">
+                <a16:creationId xmlns:a16="http://schemas.microsoft.com/office/drawing/2014/main" id="{B59FD68E-19A6-4528-B231-F0FF96A813B1}"/>
+              </a:ext>
+            </a:extLst>
+          </p:cNvPr>
+          <p:cNvSpPr>
+            <a:spLocks noGrp="1"/>
+          </p:cNvSpPr>
+          <p:nvPr>
+            <p:ph type="title"/>
+          </p:nvPr>
+        </p:nvSpPr>
+        <p:spPr/>
+        <p:txBody>
+          <a:bodyPr/>
+          <a:lstStyle/>
+          <a:p>
+            <a:r>
+              <a:rPr lang="en-US" dirty="0" err="1"/>
+              <a:t>GetDatasetsInGroupAsAdmin</a:t>
+            </a:r>
+            <a:endParaRPr lang="en-US" dirty="0"/>
+          </a:p>
+        </p:txBody>
+      </p:sp>
+      <p:sp>
+        <p:nvSpPr>
+          <p:cNvPr id="3" name="Text Placeholder 2">
+            <a:extLst>
+              <a:ext uri="{FF2B5EF4-FFF2-40B4-BE49-F238E27FC236}">
+                <a16:creationId xmlns:a16="http://schemas.microsoft.com/office/drawing/2014/main" id="{1F283276-8FEF-4E9F-8515-D83376D5804E}"/>
+              </a:ext>
+            </a:extLst>
+          </p:cNvPr>
+          <p:cNvSpPr>
+            <a:spLocks noGrp="1"/>
+          </p:cNvSpPr>
+          <p:nvPr>
+            <p:ph type="body" sz="quarter" idx="10"/>
+          </p:nvPr>
+        </p:nvSpPr>
+        <p:spPr/>
+        <p:txBody>
+          <a:bodyPr/>
+          <a:lstStyle/>
+          <a:p>
+            <a:endParaRPr lang="en-US"/>
+          </a:p>
+        </p:txBody>
+      </p:sp>
+    </p:spTree>
+    <p:extLst>
+      <p:ext uri="{BB962C8B-B14F-4D97-AF65-F5344CB8AC3E}">
+        <p14:creationId xmlns:p14="http://schemas.microsoft.com/office/powerpoint/2010/main" val="1412302072"/>
+      </p:ext>
+    </p:extLst>
+  </p:cSld>
+  <p:clrMapOvr>
+    <a:masterClrMapping/>
+  </p:clrMapOvr>
+  <p:transition>
+    <p:fade/>
+  </p:transition>
+</p:sld>
+</file>
+
+<file path=ppt/slides/slide12.xml><?xml version="1.0" encoding="utf-8"?>
+<p:sld xmlns:a="http://schemas.openxmlformats.org/drawingml/2006/main" xmlns:r="http://schemas.openxmlformats.org/officeDocument/2006/relationships" xmlns:p="http://schemas.openxmlformats.org/presentationml/2006/main">
+  <p:cSld>
+    <p:spTree>
+      <p:nvGrpSpPr>
+        <p:cNvPr id="1" name=""/>
+        <p:cNvGrpSpPr/>
+        <p:nvPr/>
+      </p:nvGrpSpPr>
+      <p:grpSpPr>
+        <a:xfrm>
+          <a:off x="0" y="0"/>
+          <a:ext cx="0" cy="0"/>
+          <a:chOff x="0" y="0"/>
+          <a:chExt cx="0" cy="0"/>
+        </a:xfrm>
+      </p:grpSpPr>
+      <p:sp>
+        <p:nvSpPr>
+          <p:cNvPr id="2" name="Title 1">
+            <a:extLst>
+              <a:ext uri="{FF2B5EF4-FFF2-40B4-BE49-F238E27FC236}">
+                <a16:creationId xmlns:a16="http://schemas.microsoft.com/office/drawing/2014/main" id="{ACD374EF-9E97-42C1-9732-10A7E63801A4}"/>
+              </a:ext>
+            </a:extLst>
+          </p:cNvPr>
+          <p:cNvSpPr>
+            <a:spLocks noGrp="1"/>
+          </p:cNvSpPr>
+          <p:nvPr>
+            <p:ph type="title"/>
+          </p:nvPr>
+        </p:nvSpPr>
+        <p:spPr/>
+        <p:txBody>
+          <a:bodyPr/>
+          <a:lstStyle/>
+          <a:p>
+            <a:r>
+              <a:rPr lang="en-US" dirty="0" err="1"/>
+              <a:t>GetCapacitiesAsAdmin</a:t>
+            </a:r>
+            <a:endParaRPr lang="en-US" dirty="0"/>
+          </a:p>
+        </p:txBody>
+      </p:sp>
+      <p:sp>
+        <p:nvSpPr>
+          <p:cNvPr id="3" name="Text Placeholder 2">
+            <a:extLst>
+              <a:ext uri="{FF2B5EF4-FFF2-40B4-BE49-F238E27FC236}">
+                <a16:creationId xmlns:a16="http://schemas.microsoft.com/office/drawing/2014/main" id="{24647E81-14C2-40B7-B6B9-6B8C6862190B}"/>
+              </a:ext>
+            </a:extLst>
+          </p:cNvPr>
+          <p:cNvSpPr>
+            <a:spLocks noGrp="1"/>
+          </p:cNvSpPr>
+          <p:nvPr>
+            <p:ph type="body" sz="quarter" idx="10"/>
+          </p:nvPr>
+        </p:nvSpPr>
+        <p:spPr/>
+        <p:txBody>
+          <a:bodyPr/>
+          <a:lstStyle/>
+          <a:p>
+            <a:endParaRPr lang="en-US"/>
+          </a:p>
+        </p:txBody>
+      </p:sp>
+    </p:spTree>
+    <p:extLst>
+      <p:ext uri="{BB962C8B-B14F-4D97-AF65-F5344CB8AC3E}">
+        <p14:creationId xmlns:p14="http://schemas.microsoft.com/office/powerpoint/2010/main" val="1749861990"/>
+      </p:ext>
+    </p:extLst>
+  </p:cSld>
+  <p:clrMapOvr>
+    <a:masterClrMapping/>
+  </p:clrMapOvr>
+  <p:transition>
+    <p:fade/>
+  </p:transition>
+</p:sld>
+</file>
+
+<file path=ppt/slides/slide13.xml><?xml version="1.0" encoding="utf-8"?>
+<p:sld xmlns:a="http://schemas.openxmlformats.org/drawingml/2006/main" xmlns:r="http://schemas.openxmlformats.org/officeDocument/2006/relationships" xmlns:p="http://schemas.openxmlformats.org/presentationml/2006/main">
+  <p:cSld>
+    <p:spTree>
+      <p:nvGrpSpPr>
+        <p:cNvPr id="1" name=""/>
+        <p:cNvGrpSpPr/>
+        <p:nvPr/>
+      </p:nvGrpSpPr>
+      <p:grpSpPr>
+        <a:xfrm>
+          <a:off x="0" y="0"/>
+          <a:ext cx="0" cy="0"/>
+          <a:chOff x="0" y="0"/>
+          <a:chExt cx="0" cy="0"/>
+        </a:xfrm>
+      </p:grpSpPr>
+      <p:sp>
+        <p:nvSpPr>
+          <p:cNvPr id="2" name="Title 1">
+            <a:extLst>
+              <a:ext uri="{FF2B5EF4-FFF2-40B4-BE49-F238E27FC236}">
+                <a16:creationId xmlns:a16="http://schemas.microsoft.com/office/drawing/2014/main" id="{B59FD68E-19A6-4528-B231-F0FF96A813B1}"/>
+              </a:ext>
+            </a:extLst>
+          </p:cNvPr>
+          <p:cNvSpPr>
+            <a:spLocks noGrp="1"/>
+          </p:cNvSpPr>
+          <p:nvPr>
+            <p:ph type="title"/>
+          </p:nvPr>
+        </p:nvSpPr>
+        <p:spPr/>
+        <p:txBody>
+          <a:bodyPr/>
+          <a:lstStyle/>
+          <a:p>
+            <a:r>
+              <a:rPr lang="en-US" dirty="0" err="1"/>
+              <a:t>GetRefreshablesAsAdmin</a:t>
+            </a:r>
+            <a:endParaRPr lang="en-US" dirty="0"/>
+          </a:p>
+        </p:txBody>
+      </p:sp>
+      <p:sp>
+        <p:nvSpPr>
+          <p:cNvPr id="3" name="Text Placeholder 2">
+            <a:extLst>
+              <a:ext uri="{FF2B5EF4-FFF2-40B4-BE49-F238E27FC236}">
+                <a16:creationId xmlns:a16="http://schemas.microsoft.com/office/drawing/2014/main" id="{1F283276-8FEF-4E9F-8515-D83376D5804E}"/>
+              </a:ext>
+            </a:extLst>
+          </p:cNvPr>
+          <p:cNvSpPr>
+            <a:spLocks noGrp="1"/>
+          </p:cNvSpPr>
+          <p:nvPr>
+            <p:ph type="body" sz="quarter" idx="10"/>
+          </p:nvPr>
+        </p:nvSpPr>
+        <p:spPr/>
+        <p:txBody>
+          <a:bodyPr/>
+          <a:lstStyle/>
+          <a:p>
+            <a:endParaRPr lang="en-US"/>
+          </a:p>
+        </p:txBody>
+      </p:sp>
+    </p:spTree>
+    <p:extLst>
+      <p:ext uri="{BB962C8B-B14F-4D97-AF65-F5344CB8AC3E}">
+        <p14:creationId xmlns:p14="http://schemas.microsoft.com/office/powerpoint/2010/main" val="2635341399"/>
+      </p:ext>
+    </p:extLst>
+  </p:cSld>
+  <p:clrMapOvr>
+    <a:masterClrMapping/>
+  </p:clrMapOvr>
+  <p:transition>
+    <p:fade/>
+  </p:transition>
+</p:sld>
+</file>
+
+<file path=ppt/slides/slide14.xml><?xml version="1.0" encoding="utf-8"?>
+<p:sld xmlns:a="http://schemas.openxmlformats.org/drawingml/2006/main" xmlns:r="http://schemas.openxmlformats.org/officeDocument/2006/relationships" xmlns:p="http://schemas.openxmlformats.org/presentationml/2006/main">
+  <p:cSld>
+    <p:spTree>
+      <p:nvGrpSpPr>
+        <p:cNvPr id="1" name=""/>
+        <p:cNvGrpSpPr/>
+        <p:nvPr/>
+      </p:nvGrpSpPr>
+      <p:grpSpPr>
+        <a:xfrm>
+          <a:off x="0" y="0"/>
+          <a:ext cx="0" cy="0"/>
+          <a:chOff x="0" y="0"/>
+          <a:chExt cx="0" cy="0"/>
+        </a:xfrm>
+      </p:grpSpPr>
+      <p:sp>
+        <p:nvSpPr>
+          <p:cNvPr id="2" name="Title 1">
+            <a:extLst>
+              <a:ext uri="{FF2B5EF4-FFF2-40B4-BE49-F238E27FC236}">
+                <a16:creationId xmlns:a16="http://schemas.microsoft.com/office/drawing/2014/main" id="{B59FD68E-19A6-4528-B231-F0FF96A813B1}"/>
+              </a:ext>
+            </a:extLst>
+          </p:cNvPr>
+          <p:cNvSpPr>
+            <a:spLocks noGrp="1"/>
+          </p:cNvSpPr>
+          <p:nvPr>
+            <p:ph type="title"/>
+          </p:nvPr>
+        </p:nvSpPr>
+        <p:spPr/>
+        <p:txBody>
+          <a:bodyPr/>
+          <a:lstStyle/>
+          <a:p>
+            <a:r>
+              <a:rPr lang="en-US" dirty="0" err="1"/>
+              <a:t>GetDatasourcesAsAdmin</a:t>
+            </a:r>
+            <a:endParaRPr lang="en-US" dirty="0"/>
+          </a:p>
+        </p:txBody>
+      </p:sp>
+      <p:sp>
+        <p:nvSpPr>
+          <p:cNvPr id="3" name="Text Placeholder 2">
+            <a:extLst>
+              <a:ext uri="{FF2B5EF4-FFF2-40B4-BE49-F238E27FC236}">
+                <a16:creationId xmlns:a16="http://schemas.microsoft.com/office/drawing/2014/main" id="{1F283276-8FEF-4E9F-8515-D83376D5804E}"/>
+              </a:ext>
+            </a:extLst>
+          </p:cNvPr>
+          <p:cNvSpPr>
+            <a:spLocks noGrp="1"/>
+          </p:cNvSpPr>
+          <p:nvPr>
+            <p:ph type="body" sz="quarter" idx="10"/>
+          </p:nvPr>
+        </p:nvSpPr>
+        <p:spPr/>
+        <p:txBody>
+          <a:bodyPr/>
+          <a:lstStyle/>
+          <a:p>
+            <a:endParaRPr lang="en-US"/>
+          </a:p>
+        </p:txBody>
+      </p:sp>
+    </p:spTree>
+    <p:extLst>
+      <p:ext uri="{BB962C8B-B14F-4D97-AF65-F5344CB8AC3E}">
+        <p14:creationId xmlns:p14="http://schemas.microsoft.com/office/powerpoint/2010/main" val="25883970"/>
+      </p:ext>
+    </p:extLst>
+  </p:cSld>
+  <p:clrMapOvr>
+    <a:masterClrMapping/>
+  </p:clrMapOvr>
+  <p:transition>
+    <p:fade/>
+  </p:transition>
+</p:sld>
+</file>
+
+<file path=ppt/slides/slide15.xml><?xml version="1.0" encoding="utf-8"?>
+<p:sld xmlns:a="http://schemas.openxmlformats.org/drawingml/2006/main" xmlns:r="http://schemas.openxmlformats.org/officeDocument/2006/relationships" xmlns:p="http://schemas.openxmlformats.org/presentationml/2006/main">
+  <p:cSld>
+    <p:spTree>
+      <p:nvGrpSpPr>
+        <p:cNvPr id="1" name=""/>
+        <p:cNvGrpSpPr/>
+        <p:nvPr/>
+      </p:nvGrpSpPr>
+      <p:grpSpPr>
+        <a:xfrm>
+          <a:off x="0" y="0"/>
+          <a:ext cx="0" cy="0"/>
+          <a:chOff x="0" y="0"/>
+          <a:chExt cx="0" cy="0"/>
+        </a:xfrm>
+      </p:grpSpPr>
+      <p:sp>
+        <p:nvSpPr>
+          <p:cNvPr id="2" name="Title 1">
+            <a:extLst>
+              <a:ext uri="{FF2B5EF4-FFF2-40B4-BE49-F238E27FC236}">
+                <a16:creationId xmlns:a16="http://schemas.microsoft.com/office/drawing/2014/main" id="{B59FD68E-19A6-4528-B231-F0FF96A813B1}"/>
+              </a:ext>
+            </a:extLst>
+          </p:cNvPr>
+          <p:cNvSpPr>
+            <a:spLocks noGrp="1"/>
+          </p:cNvSpPr>
+          <p:nvPr>
+            <p:ph type="title"/>
+          </p:nvPr>
+        </p:nvSpPr>
+        <p:spPr/>
+        <p:txBody>
+          <a:bodyPr/>
+          <a:lstStyle/>
+          <a:p>
+            <a:r>
+              <a:rPr lang="en-US" dirty="0" err="1"/>
+              <a:t>GetReportsAsAdmin</a:t>
+            </a:r>
+            <a:r>
+              <a:rPr lang="en-US" dirty="0"/>
+              <a:t> and </a:t>
+            </a:r>
+            <a:r>
+              <a:rPr lang="en-US" dirty="0" err="1"/>
+              <a:t>GetDashboardsAsAdmin</a:t>
+            </a:r>
+            <a:endParaRPr lang="en-US" dirty="0"/>
+          </a:p>
+        </p:txBody>
+      </p:sp>
+      <p:sp>
+        <p:nvSpPr>
+          <p:cNvPr id="3" name="Text Placeholder 2">
+            <a:extLst>
+              <a:ext uri="{FF2B5EF4-FFF2-40B4-BE49-F238E27FC236}">
+                <a16:creationId xmlns:a16="http://schemas.microsoft.com/office/drawing/2014/main" id="{1F283276-8FEF-4E9F-8515-D83376D5804E}"/>
+              </a:ext>
+            </a:extLst>
+          </p:cNvPr>
+          <p:cNvSpPr>
+            <a:spLocks noGrp="1"/>
+          </p:cNvSpPr>
+          <p:nvPr>
+            <p:ph type="body" sz="quarter" idx="10"/>
+          </p:nvPr>
+        </p:nvSpPr>
+        <p:spPr/>
+        <p:txBody>
+          <a:bodyPr/>
+          <a:lstStyle/>
+          <a:p>
+            <a:endParaRPr lang="en-US"/>
+          </a:p>
+        </p:txBody>
+      </p:sp>
+    </p:spTree>
+    <p:extLst>
+      <p:ext uri="{BB962C8B-B14F-4D97-AF65-F5344CB8AC3E}">
+        <p14:creationId xmlns:p14="http://schemas.microsoft.com/office/powerpoint/2010/main" val="3533479153"/>
+      </p:ext>
+    </p:extLst>
+  </p:cSld>
+  <p:clrMapOvr>
+    <a:masterClrMapping/>
+  </p:clrMapOvr>
+  <p:transition>
+    <p:fade/>
+  </p:transition>
+</p:sld>
+</file>
+
+<file path=ppt/slides/slide16.xml><?xml version="1.0" encoding="utf-8"?>
+<p:sld xmlns:a="http://schemas.openxmlformats.org/drawingml/2006/main" xmlns:r="http://schemas.openxmlformats.org/officeDocument/2006/relationships" xmlns:p="http://schemas.openxmlformats.org/presentationml/2006/main">
+  <p:cSld>
+    <p:spTree>
+      <p:nvGrpSpPr>
+        <p:cNvPr id="1" name=""/>
+        <p:cNvGrpSpPr/>
+        <p:nvPr/>
+      </p:nvGrpSpPr>
+      <p:grpSpPr>
+        <a:xfrm>
+          <a:off x="0" y="0"/>
+          <a:ext cx="0" cy="0"/>
+          <a:chOff x="0" y="0"/>
+          <a:chExt cx="0" cy="0"/>
+        </a:xfrm>
+      </p:grpSpPr>
+      <p:sp>
+        <p:nvSpPr>
+          <p:cNvPr id="2" name="Title 1">
+            <a:extLst>
+              <a:ext uri="{FF2B5EF4-FFF2-40B4-BE49-F238E27FC236}">
+                <a16:creationId xmlns:a16="http://schemas.microsoft.com/office/drawing/2014/main" id="{7D0E3AFF-283E-4C02-8AD2-B504599BEA75}"/>
+              </a:ext>
+            </a:extLst>
+          </p:cNvPr>
+          <p:cNvSpPr>
+            <a:spLocks noGrp="1"/>
+          </p:cNvSpPr>
+          <p:nvPr>
+            <p:ph type="title"/>
+          </p:nvPr>
+        </p:nvSpPr>
+        <p:spPr/>
+        <p:txBody>
+          <a:bodyPr/>
+          <a:lstStyle/>
+          <a:p>
+            <a:r>
+              <a:rPr lang="en-US" dirty="0" err="1"/>
+              <a:t>GetAppsAsAdmin</a:t>
+            </a:r>
+            <a:endParaRPr lang="en-US" dirty="0"/>
+          </a:p>
+        </p:txBody>
+      </p:sp>
+      <p:sp>
+        <p:nvSpPr>
+          <p:cNvPr id="3" name="Text Placeholder 2">
+            <a:extLst>
+              <a:ext uri="{FF2B5EF4-FFF2-40B4-BE49-F238E27FC236}">
+                <a16:creationId xmlns:a16="http://schemas.microsoft.com/office/drawing/2014/main" id="{651DF5FE-D802-453C-AC92-58757BC39653}"/>
+              </a:ext>
+            </a:extLst>
+          </p:cNvPr>
+          <p:cNvSpPr>
+            <a:spLocks noGrp="1"/>
+          </p:cNvSpPr>
+          <p:nvPr>
+            <p:ph type="body" sz="quarter" idx="10"/>
+          </p:nvPr>
+        </p:nvSpPr>
+        <p:spPr/>
+        <p:txBody>
+          <a:bodyPr/>
+          <a:lstStyle/>
+          <a:p>
+            <a:endParaRPr lang="en-US"/>
+          </a:p>
+        </p:txBody>
+      </p:sp>
+    </p:spTree>
+    <p:extLst>
+      <p:ext uri="{BB962C8B-B14F-4D97-AF65-F5344CB8AC3E}">
+        <p14:creationId xmlns:p14="http://schemas.microsoft.com/office/powerpoint/2010/main" val="3235375979"/>
+      </p:ext>
+    </p:extLst>
+  </p:cSld>
+  <p:clrMapOvr>
+    <a:masterClrMapping/>
+  </p:clrMapOvr>
+  <p:transition>
+    <p:fade/>
+  </p:transition>
+</p:sld>
+</file>
+
+<file path=ppt/slides/slide17.xml><?xml version="1.0" encoding="utf-8"?>
+<p:sld xmlns:a="http://schemas.openxmlformats.org/drawingml/2006/main" xmlns:r="http://schemas.openxmlformats.org/officeDocument/2006/relationships" xmlns:p="http://schemas.openxmlformats.org/presentationml/2006/main">
+  <p:cSld>
+    <p:spTree>
+      <p:nvGrpSpPr>
+        <p:cNvPr id="1" name=""/>
+        <p:cNvGrpSpPr/>
+        <p:nvPr/>
+      </p:nvGrpSpPr>
+      <p:grpSpPr>
+        <a:xfrm>
+          <a:off x="0" y="0"/>
+          <a:ext cx="0" cy="0"/>
+          <a:chOff x="0" y="0"/>
+          <a:chExt cx="0" cy="0"/>
+        </a:xfrm>
+      </p:grpSpPr>
+      <p:sp>
+        <p:nvSpPr>
+          <p:cNvPr id="6" name="Title 5">
+            <a:extLst>
+              <a:ext uri="{FF2B5EF4-FFF2-40B4-BE49-F238E27FC236}">
+                <a16:creationId xmlns:a16="http://schemas.microsoft.com/office/drawing/2014/main" id="{E7BF15BD-001C-49B3-9A01-B39DEDA47564}"/>
+              </a:ext>
+            </a:extLst>
+          </p:cNvPr>
+          <p:cNvSpPr>
+            <a:spLocks noGrp="1"/>
+          </p:cNvSpPr>
+          <p:nvPr>
+            <p:ph type="title"/>
+          </p:nvPr>
+        </p:nvSpPr>
+        <p:spPr>
+          <a:xfrm>
+            <a:off x="314324" y="190500"/>
+            <a:ext cx="11801475" cy="498598"/>
+          </a:xfrm>
+        </p:spPr>
+        <p:txBody>
+          <a:bodyPr/>
+          <a:lstStyle/>
+          <a:p>
+            <a:r>
+              <a:rPr lang="en-US" dirty="0"/>
+              <a:t>Agenda</a:t>
+            </a:r>
+          </a:p>
+        </p:txBody>
+      </p:sp>
+      <p:sp>
+        <p:nvSpPr>
+          <p:cNvPr id="2" name="Text Placeholder 1">
+            <a:extLst>
+              <a:ext uri="{FF2B5EF4-FFF2-40B4-BE49-F238E27FC236}">
+                <a16:creationId xmlns:a16="http://schemas.microsoft.com/office/drawing/2014/main" id="{A0A8A0CE-A7DF-4549-ABC9-3E2EC64106BC}"/>
+              </a:ext>
+            </a:extLst>
+          </p:cNvPr>
+          <p:cNvSpPr>
+            <a:spLocks noGrp="1"/>
+          </p:cNvSpPr>
+          <p:nvPr>
+            <p:ph type="body" sz="quarter" idx="10"/>
+          </p:nvPr>
+        </p:nvSpPr>
+        <p:spPr>
+          <a:xfrm>
+            <a:off x="511277" y="1227439"/>
+            <a:ext cx="11604521" cy="4054956"/>
+          </a:xfrm>
+        </p:spPr>
+        <p:txBody>
+          <a:bodyPr/>
+          <a:lstStyle/>
+          <a:p>
+            <a:pPr>
+              <a:buFont typeface="Wingdings" panose="05000000000000000000" pitchFamily="2" charset="2"/>
+              <a:buChar char="ü"/>
+            </a:pPr>
+            <a:r>
+              <a:rPr lang="en-US" dirty="0"/>
+              <a:t>Introduction to the Power BI Admin APIs</a:t>
+            </a:r>
+          </a:p>
+          <a:p>
+            <a:pPr>
+              <a:buFont typeface="Wingdings" panose="05000000000000000000" pitchFamily="2" charset="2"/>
+              <a:buChar char="ü"/>
+            </a:pPr>
+            <a:r>
+              <a:rPr lang="en-US" dirty="0"/>
+              <a:t>Discovering Workspaces and Artifacts</a:t>
+            </a:r>
+          </a:p>
+          <a:p>
+            <a:pPr>
+              <a:buFont typeface="Wingdings" panose="05000000000000000000" pitchFamily="2" charset="2"/>
+              <a:buChar char="Ø"/>
+            </a:pPr>
+            <a:r>
+              <a:rPr lang="en-US" dirty="0"/>
+              <a:t>Enforcing Governance</a:t>
+            </a:r>
+          </a:p>
+          <a:p>
+            <a:r>
+              <a:rPr lang="en-US" dirty="0"/>
+              <a:t>Scanning Workspaces</a:t>
+            </a:r>
+          </a:p>
+          <a:p>
+            <a:r>
+              <a:rPr lang="en-US" dirty="0"/>
+              <a:t>Extracting Activity Events</a:t>
+            </a:r>
+          </a:p>
+          <a:p>
+            <a:r>
+              <a:rPr lang="en-US" dirty="0"/>
+              <a:t>Power BI Admin API Roadmap</a:t>
+            </a:r>
+          </a:p>
+          <a:p>
+            <a:pPr lvl="1">
+              <a:buFont typeface="Wingdings" panose="05000000000000000000" pitchFamily="2" charset="2"/>
+              <a:buChar char="Ø"/>
+            </a:pPr>
+            <a:endParaRPr lang="en-US" dirty="0"/>
+          </a:p>
+          <a:p>
+            <a:pPr lvl="1">
+              <a:buFont typeface="Wingdings" panose="05000000000000000000" pitchFamily="2" charset="2"/>
+              <a:buChar char="Ø"/>
+            </a:pPr>
+            <a:endParaRPr lang="en-US" dirty="0"/>
+          </a:p>
+        </p:txBody>
+      </p:sp>
+    </p:spTree>
+    <p:extLst>
+      <p:ext uri="{BB962C8B-B14F-4D97-AF65-F5344CB8AC3E}">
+        <p14:creationId xmlns:p14="http://schemas.microsoft.com/office/powerpoint/2010/main" val="1033924451"/>
+      </p:ext>
+    </p:extLst>
+  </p:cSld>
+  <p:clrMapOvr>
+    <a:masterClrMapping/>
+  </p:clrMapOvr>
+  <mc:AlternateContent xmlns:mc="http://schemas.openxmlformats.org/markup-compatibility/2006" xmlns:p14="http://schemas.microsoft.com/office/powerpoint/2010/main">
+    <mc:Choice Requires="p14">
+      <p:transition p14:dur="0"/>
+    </mc:Choice>
+    <mc:Fallback xmlns="">
+      <p:transition/>
+    </mc:Fallback>
+  </mc:AlternateContent>
+</p:sld>
+</file>
+
+<file path=ppt/slides/slide18.xml><?xml version="1.0" encoding="utf-8"?>
+<p:sld xmlns:a="http://schemas.openxmlformats.org/drawingml/2006/main" xmlns:r="http://schemas.openxmlformats.org/officeDocument/2006/relationships" xmlns:p="http://schemas.openxmlformats.org/presentationml/2006/main">
+  <p:cSld>
+    <p:spTree>
+      <p:nvGrpSpPr>
+        <p:cNvPr id="1" name=""/>
+        <p:cNvGrpSpPr/>
+        <p:nvPr/>
+      </p:nvGrpSpPr>
+      <p:grpSpPr>
+        <a:xfrm>
+          <a:off x="0" y="0"/>
+          <a:ext cx="0" cy="0"/>
+          <a:chOff x="0" y="0"/>
+          <a:chExt cx="0" cy="0"/>
+        </a:xfrm>
+      </p:grpSpPr>
+      <p:sp>
+        <p:nvSpPr>
+          <p:cNvPr id="2" name="Title 1">
+            <a:extLst>
+              <a:ext uri="{FF2B5EF4-FFF2-40B4-BE49-F238E27FC236}">
+                <a16:creationId xmlns:a16="http://schemas.microsoft.com/office/drawing/2014/main" id="{B59FD68E-19A6-4528-B231-F0FF96A813B1}"/>
+              </a:ext>
+            </a:extLst>
+          </p:cNvPr>
+          <p:cNvSpPr>
+            <a:spLocks noGrp="1"/>
+          </p:cNvSpPr>
+          <p:nvPr>
+            <p:ph type="title"/>
+          </p:nvPr>
+        </p:nvSpPr>
+        <p:spPr/>
+        <p:txBody>
+          <a:bodyPr/>
+          <a:lstStyle/>
+          <a:p>
+            <a:r>
+              <a:rPr lang="en-US" dirty="0"/>
+              <a:t>Question: Who Has Access to a Specific Artifact</a:t>
+            </a:r>
+          </a:p>
+        </p:txBody>
+      </p:sp>
+      <p:sp>
+        <p:nvSpPr>
+          <p:cNvPr id="3" name="Text Placeholder 2">
+            <a:extLst>
+              <a:ext uri="{FF2B5EF4-FFF2-40B4-BE49-F238E27FC236}">
+                <a16:creationId xmlns:a16="http://schemas.microsoft.com/office/drawing/2014/main" id="{1F283276-8FEF-4E9F-8515-D83376D5804E}"/>
+              </a:ext>
+            </a:extLst>
+          </p:cNvPr>
+          <p:cNvSpPr>
+            <a:spLocks noGrp="1"/>
+          </p:cNvSpPr>
+          <p:nvPr>
+            <p:ph type="body" sz="quarter" idx="10"/>
+          </p:nvPr>
+        </p:nvSpPr>
+        <p:spPr>
+          <a:xfrm>
+            <a:off x="511277" y="1227439"/>
+            <a:ext cx="11604521" cy="2616101"/>
+          </a:xfrm>
+        </p:spPr>
+        <p:txBody>
+          <a:bodyPr/>
+          <a:lstStyle/>
+          <a:p>
+            <a:r>
+              <a:rPr lang="en-US" dirty="0" err="1"/>
+              <a:t>GetReportUsersAsAdmin</a:t>
+            </a:r>
+            <a:endParaRPr lang="en-US" dirty="0"/>
+          </a:p>
+          <a:p>
+            <a:r>
+              <a:rPr lang="en-US" dirty="0" err="1"/>
+              <a:t>GetDatasetUsersAsAdmin</a:t>
+            </a:r>
+            <a:endParaRPr lang="en-US" dirty="0"/>
+          </a:p>
+          <a:p>
+            <a:r>
+              <a:rPr lang="en-US" dirty="0" err="1"/>
+              <a:t>GetDashboardUsersAsAdmin</a:t>
+            </a:r>
+            <a:endParaRPr lang="en-US" dirty="0"/>
+          </a:p>
+          <a:p>
+            <a:r>
+              <a:rPr lang="en-US" dirty="0" err="1"/>
+              <a:t>GetDataflowUsersAsAdmin</a:t>
+            </a:r>
+            <a:endParaRPr lang="en-US" dirty="0"/>
+          </a:p>
+          <a:p>
+            <a:r>
+              <a:rPr lang="en-US" dirty="0" err="1"/>
+              <a:t>GetAppUsersAsAdmin</a:t>
+            </a:r>
+            <a:endParaRPr lang="en-US" dirty="0"/>
+          </a:p>
+        </p:txBody>
+      </p:sp>
+    </p:spTree>
+    <p:extLst>
+      <p:ext uri="{BB962C8B-B14F-4D97-AF65-F5344CB8AC3E}">
+        <p14:creationId xmlns:p14="http://schemas.microsoft.com/office/powerpoint/2010/main" val="1783406301"/>
+      </p:ext>
+    </p:extLst>
+  </p:cSld>
+  <p:clrMapOvr>
+    <a:masterClrMapping/>
+  </p:clrMapOvr>
+  <p:transition>
+    <p:fade/>
+  </p:transition>
+</p:sld>
+</file>
+
+<file path=ppt/slides/slide19.xml><?xml version="1.0" encoding="utf-8"?>
+<p:sld xmlns:a="http://schemas.openxmlformats.org/drawingml/2006/main" xmlns:r="http://schemas.openxmlformats.org/officeDocument/2006/relationships" xmlns:p="http://schemas.openxmlformats.org/presentationml/2006/main">
+  <p:cSld>
+    <p:spTree>
+      <p:nvGrpSpPr>
+        <p:cNvPr id="1" name=""/>
+        <p:cNvGrpSpPr/>
+        <p:nvPr/>
+      </p:nvGrpSpPr>
+      <p:grpSpPr>
+        <a:xfrm>
+          <a:off x="0" y="0"/>
+          <a:ext cx="0" cy="0"/>
+          <a:chOff x="0" y="0"/>
+          <a:chExt cx="0" cy="0"/>
+        </a:xfrm>
+      </p:grpSpPr>
+      <p:sp>
+        <p:nvSpPr>
+          <p:cNvPr id="2" name="Title 1">
+            <a:extLst>
+              <a:ext uri="{FF2B5EF4-FFF2-40B4-BE49-F238E27FC236}">
+                <a16:creationId xmlns:a16="http://schemas.microsoft.com/office/drawing/2014/main" id="{8749A59C-9016-4BED-9F15-6002C74EB064}"/>
+              </a:ext>
+            </a:extLst>
+          </p:cNvPr>
+          <p:cNvSpPr>
+            <a:spLocks noGrp="1"/>
+          </p:cNvSpPr>
+          <p:nvPr>
+            <p:ph type="title"/>
+          </p:nvPr>
+        </p:nvSpPr>
+        <p:spPr/>
+        <p:txBody>
+          <a:bodyPr/>
+          <a:lstStyle/>
+          <a:p>
+            <a:r>
+              <a:rPr lang="en-US" dirty="0" err="1"/>
+              <a:t>GetReportUsersAsAdmin</a:t>
+            </a:r>
+            <a:r>
+              <a:rPr lang="en-US" dirty="0"/>
+              <a:t> Example</a:t>
+            </a:r>
+          </a:p>
+        </p:txBody>
+      </p:sp>
+      <p:sp>
+        <p:nvSpPr>
+          <p:cNvPr id="3" name="Text Placeholder 2">
+            <a:extLst>
+              <a:ext uri="{FF2B5EF4-FFF2-40B4-BE49-F238E27FC236}">
+                <a16:creationId xmlns:a16="http://schemas.microsoft.com/office/drawing/2014/main" id="{42B5CA32-13C1-4B91-A891-8F6F0E61FEC0}"/>
+              </a:ext>
+            </a:extLst>
+          </p:cNvPr>
+          <p:cNvSpPr>
+            <a:spLocks noGrp="1"/>
+          </p:cNvSpPr>
+          <p:nvPr>
+            <p:ph type="body" sz="quarter" idx="10"/>
+          </p:nvPr>
+        </p:nvSpPr>
+        <p:spPr/>
+        <p:txBody>
+          <a:bodyPr/>
+          <a:lstStyle/>
+          <a:p>
+            <a:endParaRPr lang="en-US"/>
+          </a:p>
+        </p:txBody>
+      </p:sp>
+    </p:spTree>
+    <p:extLst>
+      <p:ext uri="{BB962C8B-B14F-4D97-AF65-F5344CB8AC3E}">
+        <p14:creationId xmlns:p14="http://schemas.microsoft.com/office/powerpoint/2010/main" val="2651356184"/>
+      </p:ext>
+    </p:extLst>
+  </p:cSld>
+  <p:clrMapOvr>
+    <a:masterClrMapping/>
+  </p:clrMapOvr>
+  <p:transition>
+    <p:fade/>
+  </p:transition>
+</p:sld>
+</file>
+
 <file path=ppt/slides/slide2.xml><?xml version="1.0" encoding="utf-8"?>
 <p:sld xmlns:a="http://schemas.openxmlformats.org/drawingml/2006/main" xmlns:r="http://schemas.openxmlformats.org/officeDocument/2006/relationships" xmlns:p="http://schemas.openxmlformats.org/presentationml/2006/main">
   <p:cSld>
@@ -3592,7 +4637,7 @@
         <p:spPr>
           <a:xfrm>
             <a:off x="474162" y="4944165"/>
-            <a:ext cx="9801726" cy="984885"/>
+            <a:ext cx="4670594" cy="984885"/>
           </a:xfrm>
         </p:spPr>
         <p:txBody>
@@ -3606,7 +4651,7 @@
                   <a:srgbClr val="000000"/>
                 </a:solidFill>
               </a:rPr>
-              <a:t>Ted Pattison</a:t>
+              <a:t>Rick Xu</a:t>
             </a:r>
           </a:p>
           <a:p>
@@ -3617,7 +4662,7 @@
                   <a:srgbClr val="000000"/>
                 </a:solidFill>
               </a:rPr>
-              <a:t>Principal Program Manager</a:t>
+              <a:t>Senior Program Manager</a:t>
             </a:r>
           </a:p>
           <a:p>
@@ -3628,7 +4673,7 @@
                   <a:srgbClr val="000000"/>
                 </a:solidFill>
               </a:rPr>
-              <a:t>Power BI Customer Advisory Team (PBICAT)</a:t>
+              <a:t>Power BI Team</a:t>
             </a:r>
           </a:p>
         </p:txBody>
@@ -3671,82 +4716,255 @@
       </p:sp>
       <p:sp>
         <p:nvSpPr>
-          <p:cNvPr id="6" name="Rectangle 5">
+          <p:cNvPr id="5" name="Text Placeholder 8">
             <a:extLst>
               <a:ext uri="{FF2B5EF4-FFF2-40B4-BE49-F238E27FC236}">
-                <a16:creationId xmlns:a16="http://schemas.microsoft.com/office/drawing/2014/main" id="{B5B1245A-3828-4133-831E-FCED6200FEA4}"/>
+                <a16:creationId xmlns:a16="http://schemas.microsoft.com/office/drawing/2014/main" id="{56201C99-63BD-452F-AC83-D3D858EE0DD8}"/>
               </a:ext>
             </a:extLst>
           </p:cNvPr>
-          <p:cNvSpPr/>
+          <p:cNvSpPr txBox="1">
+            <a:spLocks/>
+          </p:cNvSpPr>
           <p:nvPr/>
         </p:nvSpPr>
-        <p:spPr bwMode="auto">
+        <p:spPr>
           <a:xfrm>
-            <a:off x="169682" y="6268825"/>
-            <a:ext cx="2215299" cy="650449"/>
+            <a:off x="7017314" y="4944165"/>
+            <a:ext cx="4670594" cy="984885"/>
           </a:xfrm>
           <a:prstGeom prst="rect">
             <a:avLst/>
           </a:prstGeom>
-          <a:solidFill>
-            <a:srgbClr val="F2C80F"/>
-          </a:solidFill>
-          <a:ln>
-            <a:noFill/>
-            <a:headEnd type="none" w="med" len="med"/>
-            <a:tailEnd type="none" w="med" len="med"/>
-          </a:ln>
-          <a:effectLst/>
         </p:spPr>
-        <p:style>
-          <a:lnRef idx="1">
-            <a:schemeClr val="accent2"/>
-          </a:lnRef>
-          <a:fillRef idx="3">
-            <a:schemeClr val="accent2"/>
-          </a:fillRef>
-          <a:effectRef idx="2">
-            <a:schemeClr val="accent2"/>
-          </a:effectRef>
-          <a:fontRef idx="minor">
-            <a:schemeClr val="lt1"/>
-          </a:fontRef>
-        </p:style>
-        <p:txBody>
-          <a:bodyPr rot="0" spcFirstLastPara="0" vertOverflow="overflow" horzOverflow="overflow" vert="horz" wrap="square" lIns="182880" tIns="146304" rIns="182880" bIns="146304" numCol="1" spcCol="0" rtlCol="0" fromWordArt="0" anchor="t" anchorCtr="0" forceAA="0" compatLnSpc="1">
-            <a:prstTxWarp prst="textNoShape">
-              <a:avLst/>
-            </a:prstTxWarp>
-            <a:noAutofit/>
+        <p:txBody>
+          <a:bodyPr vert="horz" wrap="square" lIns="0" tIns="0" rIns="0" bIns="0" rtlCol="0">
+            <a:spAutoFit/>
           </a:bodyPr>
-          <a:lstStyle/>
-          <a:p>
-            <a:pPr algn="ctr" defTabSz="932472" fontAlgn="base">
+          <a:lstStyle>
+            <a:lvl1pPr marL="0" marR="0" indent="0" algn="l" defTabSz="932742" rtl="0" eaLnBrk="1" fontAlgn="auto" latinLnBrk="0" hangingPunct="1">
               <a:lnSpc>
-                <a:spcPct val="90000"/>
+                <a:spcPct val="100000"/>
               </a:lnSpc>
               <a:spcBef>
-                <a:spcPct val="0"/>
+                <a:spcPts val="0"/>
               </a:spcBef>
               <a:spcAft>
-                <a:spcPct val="0"/>
+                <a:spcPts val="0"/>
               </a:spcAft>
-            </a:pPr>
-            <a:endParaRPr lang="en-US" sz="2400" err="1">
-              <a:gradFill>
-                <a:gsLst>
-                  <a:gs pos="0">
-                    <a:srgbClr val="FFFFFF"/>
-                  </a:gs>
-                  <a:gs pos="100000">
-                    <a:srgbClr val="FFFFFF"/>
-                  </a:gs>
-                </a:gsLst>
-                <a:lin ang="5400000" scaled="0"/>
-              </a:gradFill>
-              <a:ea typeface="Segoe UI" pitchFamily="34" charset="0"/>
-              <a:cs typeface="Segoe UI" pitchFamily="34" charset="0"/>
+              <a:buClrTx/>
+              <a:buSzPct val="90000"/>
+              <a:buFont typeface="Wingdings" panose="05000000000000000000" pitchFamily="2" charset="2"/>
+              <a:buNone/>
+              <a:tabLst/>
+              <a:defRPr sz="1800" kern="1200" spc="-50" baseline="0">
+                <a:solidFill>
+                  <a:schemeClr val="tx1"/>
+                </a:solidFill>
+                <a:latin typeface="+mj-lt"/>
+                <a:ea typeface="+mn-ea"/>
+                <a:cs typeface="+mn-cs"/>
+              </a:defRPr>
+            </a:lvl1pPr>
+            <a:lvl2pPr marL="0" marR="0" indent="0" algn="l" defTabSz="932742" rtl="0" eaLnBrk="1" fontAlgn="auto" latinLnBrk="0" hangingPunct="1">
+              <a:lnSpc>
+                <a:spcPct val="100000"/>
+              </a:lnSpc>
+              <a:spcBef>
+                <a:spcPts val="0"/>
+              </a:spcBef>
+              <a:spcAft>
+                <a:spcPts val="0"/>
+              </a:spcAft>
+              <a:buClrTx/>
+              <a:buSzPct val="90000"/>
+              <a:buFont typeface="Wingdings" panose="05000000000000000000" pitchFamily="2" charset="2"/>
+              <a:buNone/>
+              <a:tabLst/>
+              <a:defRPr sz="1800" kern="1200" spc="0" baseline="0">
+                <a:solidFill>
+                  <a:schemeClr val="tx1"/>
+                </a:solidFill>
+                <a:latin typeface="+mn-lt"/>
+                <a:ea typeface="+mn-ea"/>
+                <a:cs typeface="+mn-cs"/>
+              </a:defRPr>
+            </a:lvl2pPr>
+            <a:lvl3pPr marL="0" marR="0" indent="0" algn="l" defTabSz="932742" rtl="0" eaLnBrk="1" fontAlgn="auto" latinLnBrk="0" hangingPunct="1">
+              <a:lnSpc>
+                <a:spcPct val="100000"/>
+              </a:lnSpc>
+              <a:spcBef>
+                <a:spcPts val="0"/>
+              </a:spcBef>
+              <a:spcAft>
+                <a:spcPts val="0"/>
+              </a:spcAft>
+              <a:buClrTx/>
+              <a:buSzPct val="90000"/>
+              <a:buFont typeface="Wingdings" panose="05000000000000000000" pitchFamily="2" charset="2"/>
+              <a:buNone/>
+              <a:tabLst/>
+              <a:defRPr sz="1400" kern="1200" spc="0" baseline="0">
+                <a:solidFill>
+                  <a:schemeClr val="tx2"/>
+                </a:solidFill>
+                <a:latin typeface="+mj-lt"/>
+                <a:ea typeface="+mn-ea"/>
+                <a:cs typeface="+mn-cs"/>
+              </a:defRPr>
+            </a:lvl3pPr>
+            <a:lvl4pPr marL="0" marR="0" indent="0" algn="l" defTabSz="932742" rtl="0" eaLnBrk="1" fontAlgn="auto" latinLnBrk="0" hangingPunct="1">
+              <a:lnSpc>
+                <a:spcPct val="100000"/>
+              </a:lnSpc>
+              <a:spcBef>
+                <a:spcPts val="0"/>
+              </a:spcBef>
+              <a:spcAft>
+                <a:spcPts val="0"/>
+              </a:spcAft>
+              <a:buClrTx/>
+              <a:buSzPct val="90000"/>
+              <a:buFont typeface="Wingdings" panose="05000000000000000000" pitchFamily="2" charset="2"/>
+              <a:buNone/>
+              <a:tabLst/>
+              <a:defRPr sz="1400" kern="1200" spc="0" baseline="0">
+                <a:solidFill>
+                  <a:schemeClr val="tx1"/>
+                </a:solidFill>
+                <a:latin typeface="+mn-lt"/>
+                <a:ea typeface="+mn-ea"/>
+                <a:cs typeface="+mn-cs"/>
+              </a:defRPr>
+            </a:lvl4pPr>
+            <a:lvl5pPr marL="0" marR="0" indent="0" algn="l" defTabSz="932742" rtl="0" eaLnBrk="1" fontAlgn="auto" latinLnBrk="0" hangingPunct="1">
+              <a:lnSpc>
+                <a:spcPct val="100000"/>
+              </a:lnSpc>
+              <a:spcBef>
+                <a:spcPts val="0"/>
+              </a:spcBef>
+              <a:spcAft>
+                <a:spcPts val="0"/>
+              </a:spcAft>
+              <a:buClrTx/>
+              <a:buSzPct val="90000"/>
+              <a:buFont typeface="Wingdings" panose="05000000000000000000" pitchFamily="2" charset="2"/>
+              <a:buNone/>
+              <a:tabLst/>
+              <a:defRPr sz="1050" b="1" kern="1200" spc="0" baseline="0">
+                <a:solidFill>
+                  <a:schemeClr val="tx1"/>
+                </a:solidFill>
+                <a:latin typeface="+mn-lt"/>
+                <a:ea typeface="+mn-ea"/>
+                <a:cs typeface="+mn-cs"/>
+              </a:defRPr>
+            </a:lvl5pPr>
+            <a:lvl6pPr marL="2331854" indent="0" algn="l" defTabSz="932742" rtl="0" eaLnBrk="1" latinLnBrk="0" hangingPunct="1">
+              <a:spcBef>
+                <a:spcPct val="20000"/>
+              </a:spcBef>
+              <a:buFont typeface="Arial" pitchFamily="34" charset="0"/>
+              <a:buNone/>
+              <a:defRPr sz="2000" kern="1200">
+                <a:solidFill>
+                  <a:schemeClr val="tx1"/>
+                </a:solidFill>
+                <a:latin typeface="+mn-lt"/>
+                <a:ea typeface="+mn-ea"/>
+                <a:cs typeface="+mn-cs"/>
+              </a:defRPr>
+            </a:lvl6pPr>
+            <a:lvl7pPr marL="0" indent="0" algn="l" defTabSz="932742" rtl="0" eaLnBrk="1" latinLnBrk="0" hangingPunct="1">
+              <a:lnSpc>
+                <a:spcPct val="100000"/>
+              </a:lnSpc>
+              <a:spcBef>
+                <a:spcPts val="0"/>
+              </a:spcBef>
+              <a:spcAft>
+                <a:spcPts val="0"/>
+              </a:spcAft>
+              <a:buFont typeface="Arial" pitchFamily="34" charset="0"/>
+              <a:buNone/>
+              <a:defRPr sz="1200" kern="1200">
+                <a:solidFill>
+                  <a:schemeClr val="tx1"/>
+                </a:solidFill>
+                <a:latin typeface="+mn-lt"/>
+                <a:ea typeface="+mn-ea"/>
+                <a:cs typeface="+mn-cs"/>
+              </a:defRPr>
+            </a:lvl7pPr>
+            <a:lvl8pPr marL="3497783" indent="-233186" algn="l" defTabSz="932742" rtl="0" eaLnBrk="1" latinLnBrk="0" hangingPunct="1">
+              <a:spcBef>
+                <a:spcPct val="20000"/>
+              </a:spcBef>
+              <a:buFont typeface="Arial" pitchFamily="34" charset="0"/>
+              <a:buChar char="•"/>
+              <a:defRPr sz="2000" kern="1200">
+                <a:solidFill>
+                  <a:schemeClr val="tx1"/>
+                </a:solidFill>
+                <a:latin typeface="+mn-lt"/>
+                <a:ea typeface="+mn-ea"/>
+                <a:cs typeface="+mn-cs"/>
+              </a:defRPr>
+            </a:lvl8pPr>
+            <a:lvl9pPr marL="3964155" indent="-233186" algn="l" defTabSz="932742" rtl="0" eaLnBrk="1" latinLnBrk="0" hangingPunct="1">
+              <a:spcBef>
+                <a:spcPct val="20000"/>
+              </a:spcBef>
+              <a:buFont typeface="Arial" pitchFamily="34" charset="0"/>
+              <a:buChar char="•"/>
+              <a:defRPr sz="2000" kern="1200">
+                <a:solidFill>
+                  <a:schemeClr val="tx1"/>
+                </a:solidFill>
+                <a:latin typeface="+mn-lt"/>
+                <a:ea typeface="+mn-ea"/>
+                <a:cs typeface="+mn-cs"/>
+              </a:defRPr>
+            </a:lvl9pPr>
+          </a:lstStyle>
+          <a:p>
+            <a:pPr lvl="1"/>
+            <a:r>
+              <a:rPr lang="en-US" sz="2800">
+                <a:solidFill>
+                  <a:srgbClr val="000000"/>
+                </a:solidFill>
+              </a:rPr>
+              <a:t>Ted Pattison</a:t>
+            </a:r>
+          </a:p>
+          <a:p>
+            <a:pPr lvl="1"/>
+            <a:r>
+              <a:rPr lang="en-US">
+                <a:solidFill>
+                  <a:srgbClr val="000000"/>
+                </a:solidFill>
+              </a:rPr>
+              <a:t>Principal Program Manager</a:t>
+            </a:r>
+          </a:p>
+          <a:p>
+            <a:pPr lvl="1"/>
+            <a:r>
+              <a:rPr lang="en-US">
+                <a:solidFill>
+                  <a:srgbClr val="000000"/>
+                </a:solidFill>
+              </a:rPr>
+              <a:t>Power BI Customer Advisory Team (PBICAT)</a:t>
+            </a:r>
+            <a:endParaRPr lang="en-US" dirty="0">
+              <a:solidFill>
+                <a:srgbClr val="000000"/>
+              </a:solidFill>
             </a:endParaRPr>
           </a:p>
         </p:txBody>
@@ -3771,6 +4989,1234 @@
       <p:transition spd="med">
         <p:fade/>
       </p:transition>
+    </mc:Fallback>
+  </mc:AlternateContent>
+</p:sld>
+</file>
+
+<file path=ppt/slides/slide20.xml><?xml version="1.0" encoding="utf-8"?>
+<p:sld xmlns:a="http://schemas.openxmlformats.org/drawingml/2006/main" xmlns:r="http://schemas.openxmlformats.org/officeDocument/2006/relationships" xmlns:p="http://schemas.openxmlformats.org/presentationml/2006/main">
+  <p:cSld>
+    <p:spTree>
+      <p:nvGrpSpPr>
+        <p:cNvPr id="1" name=""/>
+        <p:cNvGrpSpPr/>
+        <p:nvPr/>
+      </p:nvGrpSpPr>
+      <p:grpSpPr>
+        <a:xfrm>
+          <a:off x="0" y="0"/>
+          <a:ext cx="0" cy="0"/>
+          <a:chOff x="0" y="0"/>
+          <a:chExt cx="0" cy="0"/>
+        </a:xfrm>
+      </p:grpSpPr>
+      <p:sp>
+        <p:nvSpPr>
+          <p:cNvPr id="2" name="Title 1">
+            <a:extLst>
+              <a:ext uri="{FF2B5EF4-FFF2-40B4-BE49-F238E27FC236}">
+                <a16:creationId xmlns:a16="http://schemas.microsoft.com/office/drawing/2014/main" id="{B59FD68E-19A6-4528-B231-F0FF96A813B1}"/>
+              </a:ext>
+            </a:extLst>
+          </p:cNvPr>
+          <p:cNvSpPr>
+            <a:spLocks noGrp="1"/>
+          </p:cNvSpPr>
+          <p:nvPr>
+            <p:ph type="title"/>
+          </p:nvPr>
+        </p:nvSpPr>
+        <p:spPr/>
+        <p:txBody>
+          <a:bodyPr/>
+          <a:lstStyle/>
+          <a:p>
+            <a:r>
+              <a:rPr lang="en-US" dirty="0" err="1"/>
+              <a:t>GetUserArtifactAccessAsAdmin</a:t>
+            </a:r>
+            <a:endParaRPr lang="en-US" dirty="0"/>
+          </a:p>
+        </p:txBody>
+      </p:sp>
+      <p:sp>
+        <p:nvSpPr>
+          <p:cNvPr id="3" name="Text Placeholder 2">
+            <a:extLst>
+              <a:ext uri="{FF2B5EF4-FFF2-40B4-BE49-F238E27FC236}">
+                <a16:creationId xmlns:a16="http://schemas.microsoft.com/office/drawing/2014/main" id="{1F283276-8FEF-4E9F-8515-D83376D5804E}"/>
+              </a:ext>
+            </a:extLst>
+          </p:cNvPr>
+          <p:cNvSpPr>
+            <a:spLocks noGrp="1"/>
+          </p:cNvSpPr>
+          <p:nvPr>
+            <p:ph type="body" sz="quarter" idx="10"/>
+          </p:nvPr>
+        </p:nvSpPr>
+        <p:spPr/>
+        <p:txBody>
+          <a:bodyPr/>
+          <a:lstStyle/>
+          <a:p>
+            <a:endParaRPr lang="en-US" dirty="0"/>
+          </a:p>
+        </p:txBody>
+      </p:sp>
+    </p:spTree>
+    <p:extLst>
+      <p:ext uri="{BB962C8B-B14F-4D97-AF65-F5344CB8AC3E}">
+        <p14:creationId xmlns:p14="http://schemas.microsoft.com/office/powerpoint/2010/main" val="1557051306"/>
+      </p:ext>
+    </p:extLst>
+  </p:cSld>
+  <p:clrMapOvr>
+    <a:masterClrMapping/>
+  </p:clrMapOvr>
+  <p:transition>
+    <p:fade/>
+  </p:transition>
+</p:sld>
+</file>
+
+<file path=ppt/slides/slide21.xml><?xml version="1.0" encoding="utf-8"?>
+<p:sld xmlns:a="http://schemas.openxmlformats.org/drawingml/2006/main" xmlns:r="http://schemas.openxmlformats.org/officeDocument/2006/relationships" xmlns:p="http://schemas.openxmlformats.org/presentationml/2006/main">
+  <p:cSld>
+    <p:spTree>
+      <p:nvGrpSpPr>
+        <p:cNvPr id="1" name=""/>
+        <p:cNvGrpSpPr/>
+        <p:nvPr/>
+      </p:nvGrpSpPr>
+      <p:grpSpPr>
+        <a:xfrm>
+          <a:off x="0" y="0"/>
+          <a:ext cx="0" cy="0"/>
+          <a:chOff x="0" y="0"/>
+          <a:chExt cx="0" cy="0"/>
+        </a:xfrm>
+      </p:grpSpPr>
+      <p:sp>
+        <p:nvSpPr>
+          <p:cNvPr id="2" name="Title 1">
+            <a:extLst>
+              <a:ext uri="{FF2B5EF4-FFF2-40B4-BE49-F238E27FC236}">
+                <a16:creationId xmlns:a16="http://schemas.microsoft.com/office/drawing/2014/main" id="{B59FD68E-19A6-4528-B231-F0FF96A813B1}"/>
+              </a:ext>
+            </a:extLst>
+          </p:cNvPr>
+          <p:cNvSpPr>
+            <a:spLocks noGrp="1"/>
+          </p:cNvSpPr>
+          <p:nvPr>
+            <p:ph type="title"/>
+          </p:nvPr>
+        </p:nvSpPr>
+        <p:spPr/>
+        <p:txBody>
+          <a:bodyPr/>
+          <a:lstStyle/>
+          <a:p>
+            <a:r>
+              <a:rPr lang="en-US" dirty="0" err="1"/>
+              <a:t>GetUserSubscriptionsAsAdmin</a:t>
+            </a:r>
+            <a:endParaRPr lang="en-US" dirty="0"/>
+          </a:p>
+        </p:txBody>
+      </p:sp>
+      <p:sp>
+        <p:nvSpPr>
+          <p:cNvPr id="3" name="Text Placeholder 2">
+            <a:extLst>
+              <a:ext uri="{FF2B5EF4-FFF2-40B4-BE49-F238E27FC236}">
+                <a16:creationId xmlns:a16="http://schemas.microsoft.com/office/drawing/2014/main" id="{1F283276-8FEF-4E9F-8515-D83376D5804E}"/>
+              </a:ext>
+            </a:extLst>
+          </p:cNvPr>
+          <p:cNvSpPr>
+            <a:spLocks noGrp="1"/>
+          </p:cNvSpPr>
+          <p:nvPr>
+            <p:ph type="body" sz="quarter" idx="10"/>
+          </p:nvPr>
+        </p:nvSpPr>
+        <p:spPr/>
+        <p:txBody>
+          <a:bodyPr/>
+          <a:lstStyle/>
+          <a:p>
+            <a:endParaRPr lang="en-US"/>
+          </a:p>
+        </p:txBody>
+      </p:sp>
+    </p:spTree>
+    <p:extLst>
+      <p:ext uri="{BB962C8B-B14F-4D97-AF65-F5344CB8AC3E}">
+        <p14:creationId xmlns:p14="http://schemas.microsoft.com/office/powerpoint/2010/main" val="1854054220"/>
+      </p:ext>
+    </p:extLst>
+  </p:cSld>
+  <p:clrMapOvr>
+    <a:masterClrMapping/>
+  </p:clrMapOvr>
+  <p:transition>
+    <p:fade/>
+  </p:transition>
+</p:sld>
+</file>
+
+<file path=ppt/slides/slide22.xml><?xml version="1.0" encoding="utf-8"?>
+<p:sld xmlns:a="http://schemas.openxmlformats.org/drawingml/2006/main" xmlns:r="http://schemas.openxmlformats.org/officeDocument/2006/relationships" xmlns:p="http://schemas.openxmlformats.org/presentationml/2006/main">
+  <p:cSld>
+    <p:spTree>
+      <p:nvGrpSpPr>
+        <p:cNvPr id="1" name=""/>
+        <p:cNvGrpSpPr/>
+        <p:nvPr/>
+      </p:nvGrpSpPr>
+      <p:grpSpPr>
+        <a:xfrm>
+          <a:off x="0" y="0"/>
+          <a:ext cx="0" cy="0"/>
+          <a:chOff x="0" y="0"/>
+          <a:chExt cx="0" cy="0"/>
+        </a:xfrm>
+      </p:grpSpPr>
+      <p:sp>
+        <p:nvSpPr>
+          <p:cNvPr id="2" name="Title 1">
+            <a:extLst>
+              <a:ext uri="{FF2B5EF4-FFF2-40B4-BE49-F238E27FC236}">
+                <a16:creationId xmlns:a16="http://schemas.microsoft.com/office/drawing/2014/main" id="{B59FD68E-19A6-4528-B231-F0FF96A813B1}"/>
+              </a:ext>
+            </a:extLst>
+          </p:cNvPr>
+          <p:cNvSpPr>
+            <a:spLocks noGrp="1"/>
+          </p:cNvSpPr>
+          <p:nvPr>
+            <p:ph type="title"/>
+          </p:nvPr>
+        </p:nvSpPr>
+        <p:spPr/>
+        <p:txBody>
+          <a:bodyPr/>
+          <a:lstStyle/>
+          <a:p>
+            <a:r>
+              <a:rPr lang="en-US" dirty="0"/>
+              <a:t>Discover Widely Shared Artifacts</a:t>
+            </a:r>
+          </a:p>
+        </p:txBody>
+      </p:sp>
+      <p:sp>
+        <p:nvSpPr>
+          <p:cNvPr id="3" name="Text Placeholder 2">
+            <a:extLst>
+              <a:ext uri="{FF2B5EF4-FFF2-40B4-BE49-F238E27FC236}">
+                <a16:creationId xmlns:a16="http://schemas.microsoft.com/office/drawing/2014/main" id="{1F283276-8FEF-4E9F-8515-D83376D5804E}"/>
+              </a:ext>
+            </a:extLst>
+          </p:cNvPr>
+          <p:cNvSpPr>
+            <a:spLocks noGrp="1"/>
+          </p:cNvSpPr>
+          <p:nvPr>
+            <p:ph type="body" sz="quarter" idx="10"/>
+          </p:nvPr>
+        </p:nvSpPr>
+        <p:spPr>
+          <a:xfrm>
+            <a:off x="511277" y="1227439"/>
+            <a:ext cx="11604521" cy="1985159"/>
+          </a:xfrm>
+        </p:spPr>
+        <p:txBody>
+          <a:bodyPr/>
+          <a:lstStyle/>
+          <a:p>
+            <a:r>
+              <a:rPr lang="en-US" dirty="0"/>
+              <a:t>Find reports which have been shared to entire organization</a:t>
+            </a:r>
+          </a:p>
+          <a:p>
+            <a:pPr lvl="1"/>
+            <a:r>
+              <a:rPr lang="en-US" dirty="0" err="1"/>
+              <a:t>widelySharedArtifacts</a:t>
+            </a:r>
+            <a:r>
+              <a:rPr lang="en-US" dirty="0"/>
+              <a:t>/</a:t>
+            </a:r>
+            <a:r>
+              <a:rPr lang="en-US" dirty="0" err="1"/>
+              <a:t>linksSharedToWholeOrganization</a:t>
+            </a:r>
+            <a:endParaRPr lang="en-US" dirty="0"/>
+          </a:p>
+          <a:p>
+            <a:pPr>
+              <a:spcBef>
+                <a:spcPts val="1200"/>
+              </a:spcBef>
+            </a:pPr>
+            <a:r>
+              <a:rPr lang="en-US" dirty="0"/>
+              <a:t>Find reports which have been published using Publish to Web </a:t>
+            </a:r>
+          </a:p>
+          <a:p>
+            <a:pPr lvl="1"/>
+            <a:r>
+              <a:rPr lang="en-US" dirty="0" err="1"/>
+              <a:t>widelySharedArtifacts</a:t>
+            </a:r>
+            <a:r>
+              <a:rPr lang="en-US" dirty="0"/>
+              <a:t>/</a:t>
+            </a:r>
+            <a:r>
+              <a:rPr lang="en-US" dirty="0" err="1"/>
+              <a:t>publishedToWeb</a:t>
+            </a:r>
+            <a:r>
+              <a:rPr lang="en-US" dirty="0"/>
+              <a:t> </a:t>
+            </a:r>
+          </a:p>
+        </p:txBody>
+      </p:sp>
+    </p:spTree>
+    <p:extLst>
+      <p:ext uri="{BB962C8B-B14F-4D97-AF65-F5344CB8AC3E}">
+        <p14:creationId xmlns:p14="http://schemas.microsoft.com/office/powerpoint/2010/main" val="1045838759"/>
+      </p:ext>
+    </p:extLst>
+  </p:cSld>
+  <p:clrMapOvr>
+    <a:masterClrMapping/>
+  </p:clrMapOvr>
+  <p:transition>
+    <p:fade/>
+  </p:transition>
+</p:sld>
+</file>
+
+<file path=ppt/slides/slide23.xml><?xml version="1.0" encoding="utf-8"?>
+<p:sld xmlns:a="http://schemas.openxmlformats.org/drawingml/2006/main" xmlns:r="http://schemas.openxmlformats.org/officeDocument/2006/relationships" xmlns:p="http://schemas.openxmlformats.org/presentationml/2006/main">
+  <p:cSld>
+    <p:spTree>
+      <p:nvGrpSpPr>
+        <p:cNvPr id="1" name=""/>
+        <p:cNvGrpSpPr/>
+        <p:nvPr/>
+      </p:nvGrpSpPr>
+      <p:grpSpPr>
+        <a:xfrm>
+          <a:off x="0" y="0"/>
+          <a:ext cx="0" cy="0"/>
+          <a:chOff x="0" y="0"/>
+          <a:chExt cx="0" cy="0"/>
+        </a:xfrm>
+      </p:grpSpPr>
+      <p:sp>
+        <p:nvSpPr>
+          <p:cNvPr id="2" name="Title 1">
+            <a:extLst>
+              <a:ext uri="{FF2B5EF4-FFF2-40B4-BE49-F238E27FC236}">
+                <a16:creationId xmlns:a16="http://schemas.microsoft.com/office/drawing/2014/main" id="{B59FD68E-19A6-4528-B231-F0FF96A813B1}"/>
+              </a:ext>
+            </a:extLst>
+          </p:cNvPr>
+          <p:cNvSpPr>
+            <a:spLocks noGrp="1"/>
+          </p:cNvSpPr>
+          <p:nvPr>
+            <p:ph type="title"/>
+          </p:nvPr>
+        </p:nvSpPr>
+        <p:spPr/>
+        <p:txBody>
+          <a:bodyPr/>
+          <a:lstStyle/>
+          <a:p>
+            <a:r>
+              <a:rPr lang="en-US" dirty="0" err="1"/>
+              <a:t>GetUnusedArtifactsAsAdmin</a:t>
+            </a:r>
+            <a:endParaRPr lang="en-US" dirty="0"/>
+          </a:p>
+        </p:txBody>
+      </p:sp>
+      <p:sp>
+        <p:nvSpPr>
+          <p:cNvPr id="3" name="Text Placeholder 2">
+            <a:extLst>
+              <a:ext uri="{FF2B5EF4-FFF2-40B4-BE49-F238E27FC236}">
+                <a16:creationId xmlns:a16="http://schemas.microsoft.com/office/drawing/2014/main" id="{1F283276-8FEF-4E9F-8515-D83376D5804E}"/>
+              </a:ext>
+            </a:extLst>
+          </p:cNvPr>
+          <p:cNvSpPr>
+            <a:spLocks noGrp="1"/>
+          </p:cNvSpPr>
+          <p:nvPr>
+            <p:ph type="body" sz="quarter" idx="10"/>
+          </p:nvPr>
+        </p:nvSpPr>
+        <p:spPr>
+          <a:xfrm>
+            <a:off x="511277" y="1227439"/>
+            <a:ext cx="11604521" cy="430887"/>
+          </a:xfrm>
+        </p:spPr>
+        <p:txBody>
+          <a:bodyPr/>
+          <a:lstStyle/>
+          <a:p>
+            <a:r>
+              <a:rPr lang="en-US" dirty="0"/>
+              <a:t>Remove artifacts that are no longer used</a:t>
+            </a:r>
+          </a:p>
+        </p:txBody>
+      </p:sp>
+    </p:spTree>
+    <p:extLst>
+      <p:ext uri="{BB962C8B-B14F-4D97-AF65-F5344CB8AC3E}">
+        <p14:creationId xmlns:p14="http://schemas.microsoft.com/office/powerpoint/2010/main" val="3535335299"/>
+      </p:ext>
+    </p:extLst>
+  </p:cSld>
+  <p:clrMapOvr>
+    <a:masterClrMapping/>
+  </p:clrMapOvr>
+  <p:transition>
+    <p:fade/>
+  </p:transition>
+</p:sld>
+</file>
+
+<file path=ppt/slides/slide24.xml><?xml version="1.0" encoding="utf-8"?>
+<p:sld xmlns:a="http://schemas.openxmlformats.org/drawingml/2006/main" xmlns:r="http://schemas.openxmlformats.org/officeDocument/2006/relationships" xmlns:p="http://schemas.openxmlformats.org/presentationml/2006/main">
+  <p:cSld>
+    <p:spTree>
+      <p:nvGrpSpPr>
+        <p:cNvPr id="1" name=""/>
+        <p:cNvGrpSpPr/>
+        <p:nvPr/>
+      </p:nvGrpSpPr>
+      <p:grpSpPr>
+        <a:xfrm>
+          <a:off x="0" y="0"/>
+          <a:ext cx="0" cy="0"/>
+          <a:chOff x="0" y="0"/>
+          <a:chExt cx="0" cy="0"/>
+        </a:xfrm>
+      </p:grpSpPr>
+      <p:sp>
+        <p:nvSpPr>
+          <p:cNvPr id="2" name="Title 1">
+            <a:extLst>
+              <a:ext uri="{FF2B5EF4-FFF2-40B4-BE49-F238E27FC236}">
+                <a16:creationId xmlns:a16="http://schemas.microsoft.com/office/drawing/2014/main" id="{FFE2BA3B-476E-4485-A9C1-2F98C9843EF1}"/>
+              </a:ext>
+            </a:extLst>
+          </p:cNvPr>
+          <p:cNvSpPr>
+            <a:spLocks noGrp="1"/>
+          </p:cNvSpPr>
+          <p:nvPr>
+            <p:ph type="title"/>
+          </p:nvPr>
+        </p:nvSpPr>
+        <p:spPr/>
+        <p:txBody>
+          <a:bodyPr/>
+          <a:lstStyle/>
+          <a:p>
+            <a:r>
+              <a:rPr lang="en-US" dirty="0" err="1"/>
+              <a:t>SetLabelsAsAdmin</a:t>
+            </a:r>
+            <a:r>
+              <a:rPr lang="en-US" dirty="0"/>
+              <a:t> / </a:t>
+            </a:r>
+            <a:r>
+              <a:rPr lang="en-US" dirty="0" err="1"/>
+              <a:t>RemoveLabelsAsAdmin</a:t>
+            </a:r>
+            <a:endParaRPr lang="en-US" dirty="0"/>
+          </a:p>
+        </p:txBody>
+      </p:sp>
+      <p:sp>
+        <p:nvSpPr>
+          <p:cNvPr id="3" name="Text Placeholder 2">
+            <a:extLst>
+              <a:ext uri="{FF2B5EF4-FFF2-40B4-BE49-F238E27FC236}">
+                <a16:creationId xmlns:a16="http://schemas.microsoft.com/office/drawing/2014/main" id="{8C39CF64-0139-46AA-B0C5-F2340CED6058}"/>
+              </a:ext>
+            </a:extLst>
+          </p:cNvPr>
+          <p:cNvSpPr>
+            <a:spLocks noGrp="1"/>
+          </p:cNvSpPr>
+          <p:nvPr>
+            <p:ph type="body" sz="quarter" idx="10"/>
+          </p:nvPr>
+        </p:nvSpPr>
+        <p:spPr>
+          <a:xfrm>
+            <a:off x="511277" y="1227439"/>
+            <a:ext cx="11604521" cy="430887"/>
+          </a:xfrm>
+        </p:spPr>
+        <p:txBody>
+          <a:bodyPr/>
+          <a:lstStyle/>
+          <a:p>
+            <a:r>
+              <a:rPr lang="en-US" dirty="0"/>
+              <a:t>Managing Information Protection </a:t>
+            </a:r>
+          </a:p>
+        </p:txBody>
+      </p:sp>
+    </p:spTree>
+    <p:extLst>
+      <p:ext uri="{BB962C8B-B14F-4D97-AF65-F5344CB8AC3E}">
+        <p14:creationId xmlns:p14="http://schemas.microsoft.com/office/powerpoint/2010/main" val="4231542481"/>
+      </p:ext>
+    </p:extLst>
+  </p:cSld>
+  <p:clrMapOvr>
+    <a:masterClrMapping/>
+  </p:clrMapOvr>
+  <p:transition>
+    <p:fade/>
+  </p:transition>
+</p:sld>
+</file>
+
+<file path=ppt/slides/slide25.xml><?xml version="1.0" encoding="utf-8"?>
+<p:sld xmlns:a="http://schemas.openxmlformats.org/drawingml/2006/main" xmlns:r="http://schemas.openxmlformats.org/officeDocument/2006/relationships" xmlns:p="http://schemas.openxmlformats.org/presentationml/2006/main">
+  <p:cSld>
+    <p:spTree>
+      <p:nvGrpSpPr>
+        <p:cNvPr id="1" name=""/>
+        <p:cNvGrpSpPr/>
+        <p:nvPr/>
+      </p:nvGrpSpPr>
+      <p:grpSpPr>
+        <a:xfrm>
+          <a:off x="0" y="0"/>
+          <a:ext cx="0" cy="0"/>
+          <a:chOff x="0" y="0"/>
+          <a:chExt cx="0" cy="0"/>
+        </a:xfrm>
+      </p:grpSpPr>
+      <p:sp>
+        <p:nvSpPr>
+          <p:cNvPr id="6" name="Title 5">
+            <a:extLst>
+              <a:ext uri="{FF2B5EF4-FFF2-40B4-BE49-F238E27FC236}">
+                <a16:creationId xmlns:a16="http://schemas.microsoft.com/office/drawing/2014/main" id="{E7BF15BD-001C-49B3-9A01-B39DEDA47564}"/>
+              </a:ext>
+            </a:extLst>
+          </p:cNvPr>
+          <p:cNvSpPr>
+            <a:spLocks noGrp="1"/>
+          </p:cNvSpPr>
+          <p:nvPr>
+            <p:ph type="title"/>
+          </p:nvPr>
+        </p:nvSpPr>
+        <p:spPr>
+          <a:xfrm>
+            <a:off x="314324" y="190500"/>
+            <a:ext cx="11801475" cy="498598"/>
+          </a:xfrm>
+        </p:spPr>
+        <p:txBody>
+          <a:bodyPr/>
+          <a:lstStyle/>
+          <a:p>
+            <a:r>
+              <a:rPr lang="en-US" dirty="0"/>
+              <a:t>Agenda</a:t>
+            </a:r>
+          </a:p>
+        </p:txBody>
+      </p:sp>
+      <p:sp>
+        <p:nvSpPr>
+          <p:cNvPr id="2" name="Text Placeholder 1">
+            <a:extLst>
+              <a:ext uri="{FF2B5EF4-FFF2-40B4-BE49-F238E27FC236}">
+                <a16:creationId xmlns:a16="http://schemas.microsoft.com/office/drawing/2014/main" id="{A0A8A0CE-A7DF-4549-ABC9-3E2EC64106BC}"/>
+              </a:ext>
+            </a:extLst>
+          </p:cNvPr>
+          <p:cNvSpPr>
+            <a:spLocks noGrp="1"/>
+          </p:cNvSpPr>
+          <p:nvPr>
+            <p:ph type="body" sz="quarter" idx="10"/>
+          </p:nvPr>
+        </p:nvSpPr>
+        <p:spPr>
+          <a:xfrm>
+            <a:off x="511277" y="1227439"/>
+            <a:ext cx="11604521" cy="4054956"/>
+          </a:xfrm>
+        </p:spPr>
+        <p:txBody>
+          <a:bodyPr/>
+          <a:lstStyle/>
+          <a:p>
+            <a:pPr>
+              <a:buFont typeface="Wingdings" panose="05000000000000000000" pitchFamily="2" charset="2"/>
+              <a:buChar char="ü"/>
+            </a:pPr>
+            <a:r>
+              <a:rPr lang="en-US" dirty="0"/>
+              <a:t>Introduction to the Power BI Admin APIs</a:t>
+            </a:r>
+          </a:p>
+          <a:p>
+            <a:pPr>
+              <a:buFont typeface="Wingdings" panose="05000000000000000000" pitchFamily="2" charset="2"/>
+              <a:buChar char="ü"/>
+            </a:pPr>
+            <a:r>
+              <a:rPr lang="en-US" dirty="0"/>
+              <a:t>Discovering Workspaces and Artifacts</a:t>
+            </a:r>
+          </a:p>
+          <a:p>
+            <a:pPr>
+              <a:buFont typeface="Wingdings" panose="05000000000000000000" pitchFamily="2" charset="2"/>
+              <a:buChar char="ü"/>
+            </a:pPr>
+            <a:r>
+              <a:rPr lang="en-US" dirty="0"/>
+              <a:t>Enforcing Governance</a:t>
+            </a:r>
+          </a:p>
+          <a:p>
+            <a:pPr>
+              <a:buFont typeface="Wingdings" panose="05000000000000000000" pitchFamily="2" charset="2"/>
+              <a:buChar char="Ø"/>
+            </a:pPr>
+            <a:r>
+              <a:rPr lang="en-US" dirty="0"/>
+              <a:t>Scanning Workspaces</a:t>
+            </a:r>
+          </a:p>
+          <a:p>
+            <a:r>
+              <a:rPr lang="en-US" dirty="0"/>
+              <a:t>Extracting Activity Events</a:t>
+            </a:r>
+          </a:p>
+          <a:p>
+            <a:r>
+              <a:rPr lang="en-US" dirty="0"/>
+              <a:t>Power BI Admin API Roadmap</a:t>
+            </a:r>
+          </a:p>
+          <a:p>
+            <a:pPr lvl="1">
+              <a:buFont typeface="Wingdings" panose="05000000000000000000" pitchFamily="2" charset="2"/>
+              <a:buChar char="Ø"/>
+            </a:pPr>
+            <a:endParaRPr lang="en-US" dirty="0"/>
+          </a:p>
+          <a:p>
+            <a:pPr lvl="1">
+              <a:buFont typeface="Wingdings" panose="05000000000000000000" pitchFamily="2" charset="2"/>
+              <a:buChar char="Ø"/>
+            </a:pPr>
+            <a:endParaRPr lang="en-US" dirty="0"/>
+          </a:p>
+        </p:txBody>
+      </p:sp>
+    </p:spTree>
+    <p:extLst>
+      <p:ext uri="{BB962C8B-B14F-4D97-AF65-F5344CB8AC3E}">
+        <p14:creationId xmlns:p14="http://schemas.microsoft.com/office/powerpoint/2010/main" val="3431160934"/>
+      </p:ext>
+    </p:extLst>
+  </p:cSld>
+  <p:clrMapOvr>
+    <a:masterClrMapping/>
+  </p:clrMapOvr>
+  <mc:AlternateContent xmlns:mc="http://schemas.openxmlformats.org/markup-compatibility/2006" xmlns:p14="http://schemas.microsoft.com/office/powerpoint/2010/main">
+    <mc:Choice Requires="p14">
+      <p:transition p14:dur="0"/>
+    </mc:Choice>
+    <mc:Fallback xmlns="">
+      <p:transition/>
+    </mc:Fallback>
+  </mc:AlternateContent>
+</p:sld>
+</file>
+
+<file path=ppt/slides/slide26.xml><?xml version="1.0" encoding="utf-8"?>
+<p:sld xmlns:a="http://schemas.openxmlformats.org/drawingml/2006/main" xmlns:r="http://schemas.openxmlformats.org/officeDocument/2006/relationships" xmlns:p="http://schemas.openxmlformats.org/presentationml/2006/main">
+  <p:cSld>
+    <p:spTree>
+      <p:nvGrpSpPr>
+        <p:cNvPr id="1" name=""/>
+        <p:cNvGrpSpPr/>
+        <p:nvPr/>
+      </p:nvGrpSpPr>
+      <p:grpSpPr>
+        <a:xfrm>
+          <a:off x="0" y="0"/>
+          <a:ext cx="0" cy="0"/>
+          <a:chOff x="0" y="0"/>
+          <a:chExt cx="0" cy="0"/>
+        </a:xfrm>
+      </p:grpSpPr>
+      <p:sp>
+        <p:nvSpPr>
+          <p:cNvPr id="2" name="Title 1">
+            <a:extLst>
+              <a:ext uri="{FF2B5EF4-FFF2-40B4-BE49-F238E27FC236}">
+                <a16:creationId xmlns:a16="http://schemas.microsoft.com/office/drawing/2014/main" id="{B59FD68E-19A6-4528-B231-F0FF96A813B1}"/>
+              </a:ext>
+            </a:extLst>
+          </p:cNvPr>
+          <p:cNvSpPr>
+            <a:spLocks noGrp="1"/>
+          </p:cNvSpPr>
+          <p:nvPr>
+            <p:ph type="title"/>
+          </p:nvPr>
+        </p:nvSpPr>
+        <p:spPr/>
+        <p:txBody>
+          <a:bodyPr/>
+          <a:lstStyle/>
+          <a:p>
+            <a:r>
+              <a:rPr lang="en-US" dirty="0"/>
+              <a:t>Guidance for </a:t>
+            </a:r>
+            <a:r>
+              <a:rPr lang="en-US" dirty="0" err="1"/>
+              <a:t>GetGroupsAsAdmin</a:t>
+            </a:r>
+            <a:endParaRPr lang="en-US" dirty="0"/>
+          </a:p>
+        </p:txBody>
+      </p:sp>
+      <p:sp>
+        <p:nvSpPr>
+          <p:cNvPr id="3" name="Text Placeholder 2">
+            <a:extLst>
+              <a:ext uri="{FF2B5EF4-FFF2-40B4-BE49-F238E27FC236}">
+                <a16:creationId xmlns:a16="http://schemas.microsoft.com/office/drawing/2014/main" id="{1F283276-8FEF-4E9F-8515-D83376D5804E}"/>
+              </a:ext>
+            </a:extLst>
+          </p:cNvPr>
+          <p:cNvSpPr>
+            <a:spLocks noGrp="1"/>
+          </p:cNvSpPr>
+          <p:nvPr>
+            <p:ph type="body" sz="quarter" idx="10"/>
+          </p:nvPr>
+        </p:nvSpPr>
+        <p:spPr>
+          <a:xfrm>
+            <a:off x="511277" y="1227439"/>
+            <a:ext cx="11604521" cy="5409173"/>
+          </a:xfrm>
+        </p:spPr>
+        <p:txBody>
+          <a:bodyPr/>
+          <a:lstStyle/>
+          <a:p>
+            <a:r>
+              <a:rPr lang="en-US" dirty="0"/>
+              <a:t>Make use of the $filter parameters “type” and “state”</a:t>
+            </a:r>
+          </a:p>
+          <a:p>
+            <a:pPr lvl="1"/>
+            <a:r>
+              <a:rPr lang="en-US" dirty="0"/>
+              <a:t>since these two parameters have been optimized for performance, rather than retrieving all workspaces first and filtering on the response. If you need help on the proper syntax for using the $filter parameter, refer to this helpful link</a:t>
+            </a:r>
+          </a:p>
+          <a:p>
+            <a:r>
+              <a:rPr lang="en-US" dirty="0"/>
+              <a:t>Be mindful of using the $expand filter</a:t>
+            </a:r>
+          </a:p>
+          <a:p>
+            <a:pPr lvl="1"/>
+            <a:r>
+              <a:rPr lang="en-US" dirty="0"/>
+              <a:t>, since it tends to make the API call more expensive by potentially adding large number of artifacts and/or user metadata to the response</a:t>
+            </a:r>
+          </a:p>
+          <a:p>
+            <a:r>
+              <a:rPr lang="en-US" dirty="0"/>
+              <a:t>Understand limitations of </a:t>
+            </a:r>
+            <a:r>
+              <a:rPr lang="en-US" dirty="0" err="1"/>
+              <a:t>GetGroupsAsAdmin</a:t>
+            </a:r>
+            <a:endParaRPr lang="en-US" dirty="0"/>
+          </a:p>
+          <a:p>
+            <a:pPr lvl="1"/>
+            <a:r>
+              <a:rPr lang="en-US" dirty="0" err="1"/>
+              <a:t>GetGroupsAsAdmin</a:t>
+            </a:r>
+            <a:r>
+              <a:rPr lang="en-US" dirty="0"/>
+              <a:t> limited to 50 </a:t>
+            </a:r>
+            <a:r>
+              <a:rPr lang="en-US" b="0" i="0" dirty="0">
+                <a:solidFill>
+                  <a:srgbClr val="000000"/>
+                </a:solidFill>
+                <a:effectLst/>
+                <a:latin typeface="Segoe UI Condensed"/>
+              </a:rPr>
+              <a:t>calls/hour/tenant</a:t>
+            </a:r>
+          </a:p>
+          <a:p>
+            <a:pPr lvl="1"/>
+            <a:r>
+              <a:rPr lang="en-US" dirty="0"/>
+              <a:t>Calls to </a:t>
+            </a:r>
+            <a:r>
+              <a:rPr lang="en-US" dirty="0" err="1"/>
+              <a:t>GetGroupsAsAdmin</a:t>
+            </a:r>
+            <a:r>
+              <a:rPr lang="en-US" dirty="0"/>
+              <a:t> taking more than 30 seconds will be </a:t>
+            </a:r>
+            <a:r>
+              <a:rPr lang="en-US" dirty="0" err="1"/>
+              <a:t>terminiated</a:t>
+            </a:r>
+            <a:endParaRPr lang="en-US" dirty="0"/>
+          </a:p>
+          <a:p>
+            <a:r>
+              <a:rPr lang="en-US" dirty="0"/>
+              <a:t>Leverage the Scanner API</a:t>
+            </a:r>
+          </a:p>
+          <a:p>
+            <a:pPr lvl="1"/>
+            <a:r>
+              <a:rPr lang="en-US" dirty="0"/>
+              <a:t>Asynchronous non-blocking API which can handle large number of workspaces</a:t>
+            </a:r>
+          </a:p>
+        </p:txBody>
+      </p:sp>
+    </p:spTree>
+    <p:extLst>
+      <p:ext uri="{BB962C8B-B14F-4D97-AF65-F5344CB8AC3E}">
+        <p14:creationId xmlns:p14="http://schemas.microsoft.com/office/powerpoint/2010/main" val="2769233456"/>
+      </p:ext>
+    </p:extLst>
+  </p:cSld>
+  <p:clrMapOvr>
+    <a:masterClrMapping/>
+  </p:clrMapOvr>
+  <p:transition>
+    <p:fade/>
+  </p:transition>
+</p:sld>
+</file>
+
+<file path=ppt/slides/slide27.xml><?xml version="1.0" encoding="utf-8"?>
+<p:sld xmlns:a="http://schemas.openxmlformats.org/drawingml/2006/main" xmlns:r="http://schemas.openxmlformats.org/officeDocument/2006/relationships" xmlns:p="http://schemas.openxmlformats.org/presentationml/2006/main">
+  <p:cSld>
+    <p:spTree>
+      <p:nvGrpSpPr>
+        <p:cNvPr id="1" name=""/>
+        <p:cNvGrpSpPr/>
+        <p:nvPr/>
+      </p:nvGrpSpPr>
+      <p:grpSpPr>
+        <a:xfrm>
+          <a:off x="0" y="0"/>
+          <a:ext cx="0" cy="0"/>
+          <a:chOff x="0" y="0"/>
+          <a:chExt cx="0" cy="0"/>
+        </a:xfrm>
+      </p:grpSpPr>
+      <p:sp>
+        <p:nvSpPr>
+          <p:cNvPr id="2" name="Title 1">
+            <a:extLst>
+              <a:ext uri="{FF2B5EF4-FFF2-40B4-BE49-F238E27FC236}">
+                <a16:creationId xmlns:a16="http://schemas.microsoft.com/office/drawing/2014/main" id="{B59FD68E-19A6-4528-B231-F0FF96A813B1}"/>
+              </a:ext>
+            </a:extLst>
+          </p:cNvPr>
+          <p:cNvSpPr>
+            <a:spLocks noGrp="1"/>
+          </p:cNvSpPr>
+          <p:nvPr>
+            <p:ph type="title"/>
+          </p:nvPr>
+        </p:nvSpPr>
+        <p:spPr/>
+        <p:txBody>
+          <a:bodyPr/>
+          <a:lstStyle/>
+          <a:p>
+            <a:r>
+              <a:rPr lang="en-US" dirty="0"/>
+              <a:t>Scanning Workspaces using </a:t>
+            </a:r>
+            <a:r>
+              <a:rPr lang="en-US" dirty="0" err="1"/>
+              <a:t>PostWorkspaceInfo</a:t>
+            </a:r>
+            <a:endParaRPr lang="en-US" dirty="0"/>
+          </a:p>
+        </p:txBody>
+      </p:sp>
+      <p:sp>
+        <p:nvSpPr>
+          <p:cNvPr id="3" name="Text Placeholder 2">
+            <a:extLst>
+              <a:ext uri="{FF2B5EF4-FFF2-40B4-BE49-F238E27FC236}">
+                <a16:creationId xmlns:a16="http://schemas.microsoft.com/office/drawing/2014/main" id="{1F283276-8FEF-4E9F-8515-D83376D5804E}"/>
+              </a:ext>
+            </a:extLst>
+          </p:cNvPr>
+          <p:cNvSpPr>
+            <a:spLocks noGrp="1"/>
+          </p:cNvSpPr>
+          <p:nvPr>
+            <p:ph type="body" sz="quarter" idx="10"/>
+          </p:nvPr>
+        </p:nvSpPr>
+        <p:spPr/>
+        <p:txBody>
+          <a:bodyPr/>
+          <a:lstStyle/>
+          <a:p>
+            <a:endParaRPr lang="en-US"/>
+          </a:p>
+        </p:txBody>
+      </p:sp>
+    </p:spTree>
+    <p:extLst>
+      <p:ext uri="{BB962C8B-B14F-4D97-AF65-F5344CB8AC3E}">
+        <p14:creationId xmlns:p14="http://schemas.microsoft.com/office/powerpoint/2010/main" val="549946189"/>
+      </p:ext>
+    </p:extLst>
+  </p:cSld>
+  <p:clrMapOvr>
+    <a:masterClrMapping/>
+  </p:clrMapOvr>
+  <p:transition>
+    <p:fade/>
+  </p:transition>
+</p:sld>
+</file>
+
+<file path=ppt/slides/slide28.xml><?xml version="1.0" encoding="utf-8"?>
+<p:sld xmlns:a="http://schemas.openxmlformats.org/drawingml/2006/main" xmlns:r="http://schemas.openxmlformats.org/officeDocument/2006/relationships" xmlns:p="http://schemas.openxmlformats.org/presentationml/2006/main">
+  <p:cSld>
+    <p:spTree>
+      <p:nvGrpSpPr>
+        <p:cNvPr id="1" name=""/>
+        <p:cNvGrpSpPr/>
+        <p:nvPr/>
+      </p:nvGrpSpPr>
+      <p:grpSpPr>
+        <a:xfrm>
+          <a:off x="0" y="0"/>
+          <a:ext cx="0" cy="0"/>
+          <a:chOff x="0" y="0"/>
+          <a:chExt cx="0" cy="0"/>
+        </a:xfrm>
+      </p:grpSpPr>
+      <p:sp>
+        <p:nvSpPr>
+          <p:cNvPr id="2" name="Title 1">
+            <a:extLst>
+              <a:ext uri="{FF2B5EF4-FFF2-40B4-BE49-F238E27FC236}">
+                <a16:creationId xmlns:a16="http://schemas.microsoft.com/office/drawing/2014/main" id="{F43B80DC-F1FC-474E-BB68-3D7A7731B4EF}"/>
+              </a:ext>
+            </a:extLst>
+          </p:cNvPr>
+          <p:cNvSpPr>
+            <a:spLocks noGrp="1"/>
+          </p:cNvSpPr>
+          <p:nvPr>
+            <p:ph type="title"/>
+          </p:nvPr>
+        </p:nvSpPr>
+        <p:spPr/>
+        <p:txBody>
+          <a:bodyPr/>
+          <a:lstStyle/>
+          <a:p>
+            <a:r>
+              <a:rPr lang="en-US" dirty="0"/>
+              <a:t>Asynchronous API Usage Patterns</a:t>
+            </a:r>
+          </a:p>
+        </p:txBody>
+      </p:sp>
+      <p:sp>
+        <p:nvSpPr>
+          <p:cNvPr id="3" name="Text Placeholder 2">
+            <a:extLst>
+              <a:ext uri="{FF2B5EF4-FFF2-40B4-BE49-F238E27FC236}">
+                <a16:creationId xmlns:a16="http://schemas.microsoft.com/office/drawing/2014/main" id="{289BC95B-9083-4E62-8FD5-BD8D7A9D5DA3}"/>
+              </a:ext>
+            </a:extLst>
+          </p:cNvPr>
+          <p:cNvSpPr>
+            <a:spLocks noGrp="1"/>
+          </p:cNvSpPr>
+          <p:nvPr>
+            <p:ph type="body" sz="quarter" idx="10"/>
+          </p:nvPr>
+        </p:nvSpPr>
+        <p:spPr>
+          <a:xfrm>
+            <a:off x="511277" y="1227439"/>
+            <a:ext cx="11604521" cy="1523494"/>
+          </a:xfrm>
+        </p:spPr>
+        <p:txBody>
+          <a:bodyPr/>
+          <a:lstStyle/>
+          <a:p>
+            <a:r>
+              <a:rPr lang="en-US" dirty="0" err="1"/>
+              <a:t>PostWorkspaceInfo</a:t>
+            </a:r>
+            <a:endParaRPr lang="en-US" dirty="0"/>
+          </a:p>
+          <a:p>
+            <a:r>
+              <a:rPr lang="en-US" dirty="0" err="1"/>
+              <a:t>GetScanStatus</a:t>
+            </a:r>
+            <a:endParaRPr lang="en-US" dirty="0"/>
+          </a:p>
+          <a:p>
+            <a:r>
+              <a:rPr lang="en-US" dirty="0" err="1"/>
+              <a:t>GetScanResult</a:t>
+            </a:r>
+            <a:endParaRPr lang="en-US" dirty="0"/>
+          </a:p>
+        </p:txBody>
+      </p:sp>
+    </p:spTree>
+    <p:extLst>
+      <p:ext uri="{BB962C8B-B14F-4D97-AF65-F5344CB8AC3E}">
+        <p14:creationId xmlns:p14="http://schemas.microsoft.com/office/powerpoint/2010/main" val="250882540"/>
+      </p:ext>
+    </p:extLst>
+  </p:cSld>
+  <p:clrMapOvr>
+    <a:masterClrMapping/>
+  </p:clrMapOvr>
+  <p:transition>
+    <p:fade/>
+  </p:transition>
+</p:sld>
+</file>
+
+<file path=ppt/slides/slide29.xml><?xml version="1.0" encoding="utf-8"?>
+<p:sld xmlns:a="http://schemas.openxmlformats.org/drawingml/2006/main" xmlns:r="http://schemas.openxmlformats.org/officeDocument/2006/relationships" xmlns:p="http://schemas.openxmlformats.org/presentationml/2006/main">
+  <p:cSld>
+    <p:spTree>
+      <p:nvGrpSpPr>
+        <p:cNvPr id="1" name=""/>
+        <p:cNvGrpSpPr/>
+        <p:nvPr/>
+      </p:nvGrpSpPr>
+      <p:grpSpPr>
+        <a:xfrm>
+          <a:off x="0" y="0"/>
+          <a:ext cx="0" cy="0"/>
+          <a:chOff x="0" y="0"/>
+          <a:chExt cx="0" cy="0"/>
+        </a:xfrm>
+      </p:grpSpPr>
+      <p:sp>
+        <p:nvSpPr>
+          <p:cNvPr id="6" name="Title 5">
+            <a:extLst>
+              <a:ext uri="{FF2B5EF4-FFF2-40B4-BE49-F238E27FC236}">
+                <a16:creationId xmlns:a16="http://schemas.microsoft.com/office/drawing/2014/main" id="{E7BF15BD-001C-49B3-9A01-B39DEDA47564}"/>
+              </a:ext>
+            </a:extLst>
+          </p:cNvPr>
+          <p:cNvSpPr>
+            <a:spLocks noGrp="1"/>
+          </p:cNvSpPr>
+          <p:nvPr>
+            <p:ph type="title"/>
+          </p:nvPr>
+        </p:nvSpPr>
+        <p:spPr>
+          <a:xfrm>
+            <a:off x="314324" y="190500"/>
+            <a:ext cx="11801475" cy="498598"/>
+          </a:xfrm>
+        </p:spPr>
+        <p:txBody>
+          <a:bodyPr/>
+          <a:lstStyle/>
+          <a:p>
+            <a:r>
+              <a:rPr lang="en-US" dirty="0"/>
+              <a:t>Agenda</a:t>
+            </a:r>
+          </a:p>
+        </p:txBody>
+      </p:sp>
+      <p:sp>
+        <p:nvSpPr>
+          <p:cNvPr id="2" name="Text Placeholder 1">
+            <a:extLst>
+              <a:ext uri="{FF2B5EF4-FFF2-40B4-BE49-F238E27FC236}">
+                <a16:creationId xmlns:a16="http://schemas.microsoft.com/office/drawing/2014/main" id="{A0A8A0CE-A7DF-4549-ABC9-3E2EC64106BC}"/>
+              </a:ext>
+            </a:extLst>
+          </p:cNvPr>
+          <p:cNvSpPr>
+            <a:spLocks noGrp="1"/>
+          </p:cNvSpPr>
+          <p:nvPr>
+            <p:ph type="body" sz="quarter" idx="10"/>
+          </p:nvPr>
+        </p:nvSpPr>
+        <p:spPr>
+          <a:xfrm>
+            <a:off x="511277" y="1227439"/>
+            <a:ext cx="11604521" cy="4054956"/>
+          </a:xfrm>
+        </p:spPr>
+        <p:txBody>
+          <a:bodyPr/>
+          <a:lstStyle/>
+          <a:p>
+            <a:pPr>
+              <a:buFont typeface="Wingdings" panose="05000000000000000000" pitchFamily="2" charset="2"/>
+              <a:buChar char="ü"/>
+            </a:pPr>
+            <a:r>
+              <a:rPr lang="en-US" dirty="0"/>
+              <a:t>Introduction to the Power BI Admin APIs</a:t>
+            </a:r>
+          </a:p>
+          <a:p>
+            <a:pPr>
+              <a:buFont typeface="Wingdings" panose="05000000000000000000" pitchFamily="2" charset="2"/>
+              <a:buChar char="ü"/>
+            </a:pPr>
+            <a:r>
+              <a:rPr lang="en-US" dirty="0"/>
+              <a:t>Discovering Workspaces and Artifacts</a:t>
+            </a:r>
+          </a:p>
+          <a:p>
+            <a:pPr>
+              <a:buFont typeface="Wingdings" panose="05000000000000000000" pitchFamily="2" charset="2"/>
+              <a:buChar char="ü"/>
+            </a:pPr>
+            <a:r>
+              <a:rPr lang="en-US" dirty="0"/>
+              <a:t>Enforcing Governance</a:t>
+            </a:r>
+          </a:p>
+          <a:p>
+            <a:pPr>
+              <a:buFont typeface="Wingdings" panose="05000000000000000000" pitchFamily="2" charset="2"/>
+              <a:buChar char="ü"/>
+            </a:pPr>
+            <a:r>
+              <a:rPr lang="en-US" dirty="0"/>
+              <a:t>Scanning Workspaces</a:t>
+            </a:r>
+          </a:p>
+          <a:p>
+            <a:pPr>
+              <a:buFont typeface="Wingdings" panose="05000000000000000000" pitchFamily="2" charset="2"/>
+              <a:buChar char="Ø"/>
+            </a:pPr>
+            <a:r>
+              <a:rPr lang="en-US" dirty="0"/>
+              <a:t>Extracting Activity Events</a:t>
+            </a:r>
+          </a:p>
+          <a:p>
+            <a:r>
+              <a:rPr lang="en-US" dirty="0"/>
+              <a:t>Power BI Admin API Roadmap</a:t>
+            </a:r>
+          </a:p>
+          <a:p>
+            <a:pPr lvl="1">
+              <a:buFont typeface="Wingdings" panose="05000000000000000000" pitchFamily="2" charset="2"/>
+              <a:buChar char="Ø"/>
+            </a:pPr>
+            <a:endParaRPr lang="en-US" dirty="0"/>
+          </a:p>
+          <a:p>
+            <a:pPr lvl="1">
+              <a:buFont typeface="Wingdings" panose="05000000000000000000" pitchFamily="2" charset="2"/>
+              <a:buChar char="Ø"/>
+            </a:pPr>
+            <a:endParaRPr lang="en-US" dirty="0"/>
+          </a:p>
+        </p:txBody>
+      </p:sp>
+    </p:spTree>
+    <p:extLst>
+      <p:ext uri="{BB962C8B-B14F-4D97-AF65-F5344CB8AC3E}">
+        <p14:creationId xmlns:p14="http://schemas.microsoft.com/office/powerpoint/2010/main" val="3790678969"/>
+      </p:ext>
+    </p:extLst>
+  </p:cSld>
+  <p:clrMapOvr>
+    <a:masterClrMapping/>
+  </p:clrMapOvr>
+  <mc:AlternateContent xmlns:mc="http://schemas.openxmlformats.org/markup-compatibility/2006" xmlns:p14="http://schemas.microsoft.com/office/powerpoint/2010/main">
+    <mc:Choice Requires="p14">
+      <p:transition p14:dur="0"/>
+    </mc:Choice>
+    <mc:Fallback xmlns="">
+      <p:transition/>
     </mc:Fallback>
   </mc:AlternateContent>
 </p:sld>
@@ -3907,7 +6353,7 @@
 </p:sld>
 </file>
 
-<file path=ppt/slides/slide4.xml><?xml version="1.0" encoding="utf-8"?>
+<file path=ppt/slides/slide30.xml><?xml version="1.0" encoding="utf-8"?>
 <p:sld xmlns:a="http://schemas.openxmlformats.org/drawingml/2006/main" xmlns:r="http://schemas.openxmlformats.org/officeDocument/2006/relationships" xmlns:p="http://schemas.openxmlformats.org/presentationml/2006/main">
   <p:cSld>
     <p:spTree>
@@ -3926,6 +6372,337 @@
       </p:grpSpPr>
       <p:sp>
         <p:nvSpPr>
+          <p:cNvPr id="2" name="Title 1">
+            <a:extLst>
+              <a:ext uri="{FF2B5EF4-FFF2-40B4-BE49-F238E27FC236}">
+                <a16:creationId xmlns:a16="http://schemas.microsoft.com/office/drawing/2014/main" id="{B59FD68E-19A6-4528-B231-F0FF96A813B1}"/>
+              </a:ext>
+            </a:extLst>
+          </p:cNvPr>
+          <p:cNvSpPr>
+            <a:spLocks noGrp="1"/>
+          </p:cNvSpPr>
+          <p:nvPr>
+            <p:ph type="title"/>
+          </p:nvPr>
+        </p:nvSpPr>
+        <p:spPr/>
+        <p:txBody>
+          <a:bodyPr/>
+          <a:lstStyle/>
+          <a:p>
+            <a:r>
+              <a:rPr lang="en-US" dirty="0" err="1"/>
+              <a:t>GetActivityEvents</a:t>
+            </a:r>
+            <a:endParaRPr lang="en-US" dirty="0"/>
+          </a:p>
+        </p:txBody>
+      </p:sp>
+      <p:sp>
+        <p:nvSpPr>
+          <p:cNvPr id="3" name="Text Placeholder 2">
+            <a:extLst>
+              <a:ext uri="{FF2B5EF4-FFF2-40B4-BE49-F238E27FC236}">
+                <a16:creationId xmlns:a16="http://schemas.microsoft.com/office/drawing/2014/main" id="{1F283276-8FEF-4E9F-8515-D83376D5804E}"/>
+              </a:ext>
+            </a:extLst>
+          </p:cNvPr>
+          <p:cNvSpPr>
+            <a:spLocks noGrp="1"/>
+          </p:cNvSpPr>
+          <p:nvPr>
+            <p:ph type="body" sz="quarter" idx="10"/>
+          </p:nvPr>
+        </p:nvSpPr>
+        <p:spPr>
+          <a:xfrm>
+            <a:off x="511277" y="1227439"/>
+            <a:ext cx="11604521" cy="4547399"/>
+          </a:xfrm>
+        </p:spPr>
+        <p:txBody>
+          <a:bodyPr/>
+          <a:lstStyle/>
+          <a:p>
+            <a:r>
+              <a:rPr lang="en-US" dirty="0"/>
+              <a:t>Endpoint for Get operation</a:t>
+            </a:r>
+          </a:p>
+          <a:p>
+            <a:pPr lvl="1"/>
+            <a:r>
+              <a:rPr lang="en-US" dirty="0">
+                <a:hlinkClick r:id="rId2"/>
+              </a:rPr>
+              <a:t>https://api.powerbi.com/v1.0/myorg/admin/activityevents</a:t>
+            </a:r>
+            <a:endParaRPr lang="en-US" dirty="0"/>
+          </a:p>
+          <a:p>
+            <a:pPr lvl="1"/>
+            <a:r>
+              <a:rPr lang="en-US" dirty="0"/>
+              <a:t>200 requests/hour</a:t>
+            </a:r>
+          </a:p>
+          <a:p>
+            <a:pPr lvl="1"/>
+            <a:r>
+              <a:rPr lang="en-US" dirty="0"/>
+              <a:t>Time window cannot exceed 24-hour UTC time period</a:t>
+            </a:r>
+          </a:p>
+          <a:p>
+            <a:pPr lvl="1"/>
+            <a:endParaRPr lang="en-US" dirty="0"/>
+          </a:p>
+          <a:p>
+            <a:r>
+              <a:rPr lang="en-US" dirty="0"/>
+              <a:t>Query String Parameters</a:t>
+            </a:r>
+          </a:p>
+          <a:p>
+            <a:pPr lvl="1"/>
+            <a:r>
+              <a:rPr lang="en-US" dirty="0" err="1"/>
+              <a:t>startDateTime</a:t>
+            </a:r>
+            <a:r>
+              <a:rPr lang="en-US" dirty="0"/>
+              <a:t> (e.g. '2022-01-27T00:00:00' )</a:t>
+            </a:r>
+          </a:p>
+          <a:p>
+            <a:pPr lvl="1"/>
+            <a:r>
+              <a:rPr lang="en-US" dirty="0" err="1"/>
+              <a:t>endDateTime</a:t>
+            </a:r>
+            <a:r>
+              <a:rPr lang="en-US" dirty="0"/>
+              <a:t> (e.g. '2022-01-27T23:59:59’ )</a:t>
+            </a:r>
+          </a:p>
+          <a:p>
+            <a:pPr lvl="1"/>
+            <a:r>
+              <a:rPr lang="en-US" dirty="0"/>
+              <a:t>$filter (e.g. Activity eq '</a:t>
+            </a:r>
+            <a:r>
+              <a:rPr lang="en-US" dirty="0" err="1"/>
+              <a:t>ViewReport</a:t>
+            </a:r>
+            <a:r>
+              <a:rPr lang="en-US" dirty="0"/>
+              <a:t>’)</a:t>
+            </a:r>
+          </a:p>
+          <a:p>
+            <a:pPr lvl="1"/>
+            <a:r>
+              <a:rPr lang="en-US" dirty="0" err="1"/>
+              <a:t>continuationToken</a:t>
+            </a:r>
+            <a:endParaRPr lang="en-US" dirty="0"/>
+          </a:p>
+        </p:txBody>
+      </p:sp>
+    </p:spTree>
+    <p:extLst>
+      <p:ext uri="{BB962C8B-B14F-4D97-AF65-F5344CB8AC3E}">
+        <p14:creationId xmlns:p14="http://schemas.microsoft.com/office/powerpoint/2010/main" val="1242688908"/>
+      </p:ext>
+    </p:extLst>
+  </p:cSld>
+  <p:clrMapOvr>
+    <a:masterClrMapping/>
+  </p:clrMapOvr>
+  <p:transition>
+    <p:fade/>
+  </p:transition>
+</p:sld>
+</file>
+
+<file path=ppt/slides/slide31.xml><?xml version="1.0" encoding="utf-8"?>
+<p:sld xmlns:a="http://schemas.openxmlformats.org/drawingml/2006/main" xmlns:r="http://schemas.openxmlformats.org/officeDocument/2006/relationships" xmlns:p="http://schemas.openxmlformats.org/presentationml/2006/main">
+  <p:cSld>
+    <p:spTree>
+      <p:nvGrpSpPr>
+        <p:cNvPr id="1" name=""/>
+        <p:cNvGrpSpPr/>
+        <p:nvPr/>
+      </p:nvGrpSpPr>
+      <p:grpSpPr>
+        <a:xfrm>
+          <a:off x="0" y="0"/>
+          <a:ext cx="0" cy="0"/>
+          <a:chOff x="0" y="0"/>
+          <a:chExt cx="0" cy="0"/>
+        </a:xfrm>
+      </p:grpSpPr>
+      <p:sp>
+        <p:nvSpPr>
+          <p:cNvPr id="2" name="Title 1">
+            <a:extLst>
+              <a:ext uri="{FF2B5EF4-FFF2-40B4-BE49-F238E27FC236}">
+                <a16:creationId xmlns:a16="http://schemas.microsoft.com/office/drawing/2014/main" id="{B59FD68E-19A6-4528-B231-F0FF96A813B1}"/>
+              </a:ext>
+            </a:extLst>
+          </p:cNvPr>
+          <p:cNvSpPr>
+            <a:spLocks noGrp="1"/>
+          </p:cNvSpPr>
+          <p:nvPr>
+            <p:ph type="title"/>
+          </p:nvPr>
+        </p:nvSpPr>
+        <p:spPr/>
+        <p:txBody>
+          <a:bodyPr/>
+          <a:lstStyle/>
+          <a:p>
+            <a:r>
+              <a:rPr lang="en-US" dirty="0" err="1"/>
+              <a:t>GetActivityEvents</a:t>
+            </a:r>
+            <a:endParaRPr lang="en-US" dirty="0"/>
+          </a:p>
+        </p:txBody>
+      </p:sp>
+      <p:sp>
+        <p:nvSpPr>
+          <p:cNvPr id="3" name="Text Placeholder 2">
+            <a:extLst>
+              <a:ext uri="{FF2B5EF4-FFF2-40B4-BE49-F238E27FC236}">
+                <a16:creationId xmlns:a16="http://schemas.microsoft.com/office/drawing/2014/main" id="{1F283276-8FEF-4E9F-8515-D83376D5804E}"/>
+              </a:ext>
+            </a:extLst>
+          </p:cNvPr>
+          <p:cNvSpPr>
+            <a:spLocks noGrp="1"/>
+          </p:cNvSpPr>
+          <p:nvPr>
+            <p:ph type="body" sz="quarter" idx="10"/>
+          </p:nvPr>
+        </p:nvSpPr>
+        <p:spPr/>
+        <p:txBody>
+          <a:bodyPr/>
+          <a:lstStyle/>
+          <a:p>
+            <a:endParaRPr lang="en-US" dirty="0"/>
+          </a:p>
+        </p:txBody>
+      </p:sp>
+      <p:pic>
+        <p:nvPicPr>
+          <p:cNvPr id="8" name="Picture 7">
+            <a:extLst>
+              <a:ext uri="{FF2B5EF4-FFF2-40B4-BE49-F238E27FC236}">
+                <a16:creationId xmlns:a16="http://schemas.microsoft.com/office/drawing/2014/main" id="{71ED5E0B-AC97-4DCC-82E3-005A91427EBC}"/>
+              </a:ext>
+            </a:extLst>
+          </p:cNvPr>
+          <p:cNvPicPr>
+            <a:picLocks noChangeAspect="1"/>
+          </p:cNvPicPr>
+          <p:nvPr/>
+        </p:nvPicPr>
+        <p:blipFill>
+          <a:blip r:embed="rId2"/>
+          <a:stretch>
+            <a:fillRect/>
+          </a:stretch>
+        </p:blipFill>
+        <p:spPr>
+          <a:xfrm>
+            <a:off x="1425676" y="2104602"/>
+            <a:ext cx="6803923" cy="3512130"/>
+          </a:xfrm>
+          <a:prstGeom prst="rect">
+            <a:avLst/>
+          </a:prstGeom>
+          <a:ln>
+            <a:solidFill>
+              <a:schemeClr val="tx1"/>
+            </a:solidFill>
+          </a:ln>
+        </p:spPr>
+      </p:pic>
+      <p:pic>
+        <p:nvPicPr>
+          <p:cNvPr id="9" name="Picture 8">
+            <a:extLst>
+              <a:ext uri="{FF2B5EF4-FFF2-40B4-BE49-F238E27FC236}">
+                <a16:creationId xmlns:a16="http://schemas.microsoft.com/office/drawing/2014/main" id="{BE043DF1-9FBD-43C3-A85D-98D11B8B34B5}"/>
+              </a:ext>
+            </a:extLst>
+          </p:cNvPr>
+          <p:cNvPicPr>
+            <a:picLocks noChangeAspect="1"/>
+          </p:cNvPicPr>
+          <p:nvPr/>
+        </p:nvPicPr>
+        <p:blipFill>
+          <a:blip r:embed="rId3"/>
+          <a:stretch>
+            <a:fillRect/>
+          </a:stretch>
+        </p:blipFill>
+        <p:spPr>
+          <a:xfrm>
+            <a:off x="6883121" y="4211798"/>
+            <a:ext cx="5129100" cy="2592227"/>
+          </a:xfrm>
+          <a:prstGeom prst="rect">
+            <a:avLst/>
+          </a:prstGeom>
+          <a:ln>
+            <a:solidFill>
+              <a:schemeClr val="tx1"/>
+            </a:solidFill>
+          </a:ln>
+        </p:spPr>
+      </p:pic>
+    </p:spTree>
+    <p:extLst>
+      <p:ext uri="{BB962C8B-B14F-4D97-AF65-F5344CB8AC3E}">
+        <p14:creationId xmlns:p14="http://schemas.microsoft.com/office/powerpoint/2010/main" val="3054227225"/>
+      </p:ext>
+    </p:extLst>
+  </p:cSld>
+  <p:clrMapOvr>
+    <a:masterClrMapping/>
+  </p:clrMapOvr>
+  <p:transition>
+    <p:fade/>
+  </p:transition>
+</p:sld>
+</file>
+
+<file path=ppt/slides/slide32.xml><?xml version="1.0" encoding="utf-8"?>
+<p:sld xmlns:a="http://schemas.openxmlformats.org/drawingml/2006/main" xmlns:r="http://schemas.openxmlformats.org/officeDocument/2006/relationships" xmlns:p="http://schemas.openxmlformats.org/presentationml/2006/main">
+  <p:cSld>
+    <p:spTree>
+      <p:nvGrpSpPr>
+        <p:cNvPr id="1" name=""/>
+        <p:cNvGrpSpPr/>
+        <p:nvPr/>
+      </p:nvGrpSpPr>
+      <p:grpSpPr>
+        <a:xfrm>
+          <a:off x="0" y="0"/>
+          <a:ext cx="0" cy="0"/>
+          <a:chOff x="0" y="0"/>
+          <a:chExt cx="0" cy="0"/>
+        </a:xfrm>
+      </p:grpSpPr>
+      <p:sp>
+        <p:nvSpPr>
           <p:cNvPr id="6" name="Title 5">
             <a:extLst>
               <a:ext uri="{FF2B5EF4-FFF2-40B4-BE49-F238E27FC236}">
@@ -3976,12 +6753,62 @@
         <p:spPr>
           <a:xfrm>
             <a:off x="511277" y="1227439"/>
-            <a:ext cx="11604521" cy="6078587"/>
+            <a:ext cx="11604521" cy="4054956"/>
           </a:xfrm>
         </p:spPr>
         <p:txBody>
           <a:bodyPr/>
           <a:lstStyle/>
+          <a:p>
+            <a:pPr>
+              <a:buFont typeface="Wingdings" panose="05000000000000000000" pitchFamily="2" charset="2"/>
+              <a:buChar char="ü"/>
+            </a:pPr>
+            <a:r>
+              <a:rPr lang="en-US" dirty="0"/>
+              <a:t>Introduction to the Power BI Admin APIs</a:t>
+            </a:r>
+          </a:p>
+          <a:p>
+            <a:pPr>
+              <a:buFont typeface="Wingdings" panose="05000000000000000000" pitchFamily="2" charset="2"/>
+              <a:buChar char="ü"/>
+            </a:pPr>
+            <a:r>
+              <a:rPr lang="en-US" dirty="0"/>
+              <a:t>Discovering Workspaces and Artifacts</a:t>
+            </a:r>
+          </a:p>
+          <a:p>
+            <a:pPr>
+              <a:buFont typeface="Wingdings" panose="05000000000000000000" pitchFamily="2" charset="2"/>
+              <a:buChar char="ü"/>
+            </a:pPr>
+            <a:r>
+              <a:rPr lang="en-US" dirty="0"/>
+              <a:t>Enforcing Governance</a:t>
+            </a:r>
+          </a:p>
+          <a:p>
+            <a:pPr>
+              <a:buFont typeface="Wingdings" panose="05000000000000000000" pitchFamily="2" charset="2"/>
+              <a:buChar char="ü"/>
+            </a:pPr>
+            <a:r>
+              <a:rPr lang="en-US" dirty="0"/>
+              <a:t>Scanning Workspaces</a:t>
+            </a:r>
+          </a:p>
+          <a:p>
+            <a:pPr>
+              <a:buFont typeface="Wingdings" panose="05000000000000000000" pitchFamily="2" charset="2"/>
+              <a:buChar char="ü"/>
+            </a:pPr>
+            <a:r>
+              <a:rPr lang="en-US" dirty="0"/>
+              <a:t>Extracting Activity Events</a:t>
+            </a:r>
+          </a:p>
           <a:p>
             <a:pPr>
               <a:buFont typeface="Wingdings" panose="05000000000000000000" pitchFamily="2" charset="2"/>
@@ -3989,91 +6816,7 @@
             </a:pPr>
             <a:r>
               <a:rPr lang="en-US" dirty="0"/>
-              <a:t>Intro to Power BI Admin APIs</a:t>
-            </a:r>
-          </a:p>
-          <a:p>
-            <a:pPr lvl="1">
-              <a:buFont typeface="Wingdings" panose="05000000000000000000" pitchFamily="2" charset="2"/>
-              <a:buChar char="Ø"/>
-            </a:pPr>
-            <a:r>
-              <a:rPr lang="en-US" sz="1800" dirty="0"/>
-              <a:t>User Permissions required for API access</a:t>
-            </a:r>
-          </a:p>
-          <a:p>
-            <a:pPr lvl="1">
-              <a:buFont typeface="Wingdings" panose="05000000000000000000" pitchFamily="2" charset="2"/>
-              <a:buChar char="Ø"/>
-            </a:pPr>
-            <a:r>
-              <a:rPr lang="en-US" sz="1800" dirty="0"/>
-              <a:t>Service principal configuration/permissions required for API access</a:t>
-            </a:r>
-          </a:p>
-          <a:p>
-            <a:pPr>
-              <a:buFont typeface="Wingdings" panose="05000000000000000000" pitchFamily="2" charset="2"/>
-              <a:buChar char="Ø"/>
-            </a:pPr>
-            <a:r>
-              <a:rPr lang="en-US" dirty="0"/>
-              <a:t>Generate inventory reports</a:t>
-            </a:r>
-          </a:p>
-          <a:p>
-            <a:pPr lvl="1">
-              <a:buFont typeface="Wingdings" panose="05000000000000000000" pitchFamily="2" charset="2"/>
-              <a:buChar char="Ø"/>
-            </a:pPr>
-            <a:r>
-              <a:rPr lang="en-US" sz="1800" dirty="0" err="1"/>
-              <a:t>GetGroupsAsAdmin</a:t>
-            </a:r>
-            <a:endParaRPr lang="en-US" sz="1800" dirty="0"/>
-          </a:p>
-          <a:p>
-            <a:pPr lvl="1">
-              <a:buFont typeface="Wingdings" panose="05000000000000000000" pitchFamily="2" charset="2"/>
-              <a:buChar char="Ø"/>
-            </a:pPr>
-            <a:r>
-              <a:rPr lang="en-US" sz="1800" dirty="0" err="1"/>
-              <a:t>GetDatasetsAsAdmin</a:t>
-            </a:r>
-            <a:endParaRPr lang="en-US" sz="1800" dirty="0"/>
-          </a:p>
-          <a:p>
-            <a:pPr lvl="1">
-              <a:buFont typeface="Wingdings" panose="05000000000000000000" pitchFamily="2" charset="2"/>
-              <a:buChar char="Ø"/>
-            </a:pPr>
-            <a:r>
-              <a:rPr lang="en-US" sz="1800" dirty="0" err="1"/>
-              <a:t>GetDatasourcesAsAdmin</a:t>
-            </a:r>
-            <a:endParaRPr lang="en-US" sz="1800" dirty="0"/>
-          </a:p>
-          <a:p>
-            <a:pPr lvl="1">
-              <a:buFont typeface="Wingdings" panose="05000000000000000000" pitchFamily="2" charset="2"/>
-              <a:buChar char="Ø"/>
-            </a:pPr>
-            <a:r>
-              <a:rPr lang="en-US" sz="1800" dirty="0" err="1"/>
-              <a:t>GetUnusedArtifactsAsAdmin</a:t>
-            </a:r>
-            <a:endParaRPr lang="en-US" sz="1800" dirty="0"/>
-          </a:p>
-          <a:p>
-            <a:pPr>
-              <a:buFont typeface="Wingdings" panose="05000000000000000000" pitchFamily="2" charset="2"/>
-              <a:buChar char="Ø"/>
-            </a:pPr>
-            <a:r>
-              <a:rPr lang="en-US" dirty="0"/>
-              <a:t>Access discovery</a:t>
+              <a:t>Power BI Admin API Roadmap</a:t>
             </a:r>
           </a:p>
           <a:p>
@@ -4084,45 +6827,18 @@
             <a:endParaRPr lang="en-US" dirty="0"/>
           </a:p>
           <a:p>
-            <a:pPr>
-              <a:buFont typeface="Wingdings" panose="05000000000000000000" pitchFamily="2" charset="2"/>
-              <a:buChar char="Ø"/>
-            </a:pPr>
-            <a:r>
-              <a:rPr lang="en-US" dirty="0"/>
-              <a:t>Workspace Scanner API</a:t>
-            </a:r>
-          </a:p>
-          <a:p>
-            <a:pPr>
-              <a:buFont typeface="Wingdings" panose="05000000000000000000" pitchFamily="2" charset="2"/>
-              <a:buChar char="Ø"/>
-            </a:pPr>
-            <a:r>
-              <a:rPr lang="en-US" dirty="0"/>
-              <a:t>Extracting Activity Events</a:t>
-            </a:r>
-          </a:p>
-          <a:p>
             <a:pPr lvl="1">
               <a:buFont typeface="Wingdings" panose="05000000000000000000" pitchFamily="2" charset="2"/>
               <a:buChar char="Ø"/>
             </a:pPr>
             <a:endParaRPr lang="en-US" dirty="0"/>
           </a:p>
-          <a:p>
-            <a:pPr lvl="1">
-              <a:buFont typeface="Wingdings" panose="05000000000000000000" pitchFamily="2" charset="2"/>
-              <a:buChar char="Ø"/>
-            </a:pPr>
-            <a:endParaRPr lang="en-US" dirty="0"/>
-          </a:p>
         </p:txBody>
       </p:sp>
     </p:spTree>
     <p:extLst>
       <p:ext uri="{BB962C8B-B14F-4D97-AF65-F5344CB8AC3E}">
-        <p14:creationId xmlns:p14="http://schemas.microsoft.com/office/powerpoint/2010/main" val="376308599"/>
+        <p14:creationId xmlns:p14="http://schemas.microsoft.com/office/powerpoint/2010/main" val="398387245"/>
       </p:ext>
     </p:extLst>
   </p:cSld>
@@ -4140,7 +6856,290 @@
 </p:sld>
 </file>
 
-<file path=ppt/slides/slide5.xml><?xml version="1.0" encoding="utf-8"?>
+<file path=ppt/slides/slide33.xml><?xml version="1.0" encoding="utf-8"?>
+<p:sld xmlns:a="http://schemas.openxmlformats.org/drawingml/2006/main" xmlns:r="http://schemas.openxmlformats.org/officeDocument/2006/relationships" xmlns:p="http://schemas.openxmlformats.org/presentationml/2006/main">
+  <p:cSld>
+    <p:spTree>
+      <p:nvGrpSpPr>
+        <p:cNvPr id="1" name=""/>
+        <p:cNvGrpSpPr/>
+        <p:nvPr/>
+      </p:nvGrpSpPr>
+      <p:grpSpPr>
+        <a:xfrm>
+          <a:off x="0" y="0"/>
+          <a:ext cx="0" cy="0"/>
+          <a:chOff x="0" y="0"/>
+          <a:chExt cx="0" cy="0"/>
+        </a:xfrm>
+      </p:grpSpPr>
+      <p:sp>
+        <p:nvSpPr>
+          <p:cNvPr id="2" name="Title 1">
+            <a:extLst>
+              <a:ext uri="{FF2B5EF4-FFF2-40B4-BE49-F238E27FC236}">
+                <a16:creationId xmlns:a16="http://schemas.microsoft.com/office/drawing/2014/main" id="{FFD5BEA1-2B46-4B0D-B4BA-9FA933995E06}"/>
+              </a:ext>
+            </a:extLst>
+          </p:cNvPr>
+          <p:cNvSpPr>
+            <a:spLocks noGrp="1"/>
+          </p:cNvSpPr>
+          <p:nvPr>
+            <p:ph type="title"/>
+          </p:nvPr>
+        </p:nvSpPr>
+        <p:spPr/>
+        <p:txBody>
+          <a:bodyPr/>
+          <a:lstStyle/>
+          <a:p>
+            <a:r>
+              <a:rPr lang="en-US" dirty="0">
+                <a:solidFill>
+                  <a:srgbClr val="FF0000"/>
+                </a:solidFill>
+              </a:rPr>
+              <a:t>PLACEHOLDER – Rick’s Roadmap section</a:t>
+            </a:r>
+          </a:p>
+        </p:txBody>
+      </p:sp>
+      <p:sp>
+        <p:nvSpPr>
+          <p:cNvPr id="3" name="Text Placeholder 2">
+            <a:extLst>
+              <a:ext uri="{FF2B5EF4-FFF2-40B4-BE49-F238E27FC236}">
+                <a16:creationId xmlns:a16="http://schemas.microsoft.com/office/drawing/2014/main" id="{6533E791-AA8A-42B3-9C84-E51451ACA932}"/>
+              </a:ext>
+            </a:extLst>
+          </p:cNvPr>
+          <p:cNvSpPr>
+            <a:spLocks noGrp="1"/>
+          </p:cNvSpPr>
+          <p:nvPr>
+            <p:ph type="body" sz="quarter" idx="10"/>
+          </p:nvPr>
+        </p:nvSpPr>
+        <p:spPr/>
+        <p:txBody>
+          <a:bodyPr/>
+          <a:lstStyle/>
+          <a:p>
+            <a:endParaRPr lang="en-US"/>
+          </a:p>
+        </p:txBody>
+      </p:sp>
+    </p:spTree>
+    <p:extLst>
+      <p:ext uri="{BB962C8B-B14F-4D97-AF65-F5344CB8AC3E}">
+        <p14:creationId xmlns:p14="http://schemas.microsoft.com/office/powerpoint/2010/main" val="1099209450"/>
+      </p:ext>
+    </p:extLst>
+  </p:cSld>
+  <p:clrMapOvr>
+    <a:masterClrMapping/>
+  </p:clrMapOvr>
+  <p:transition>
+    <p:fade/>
+  </p:transition>
+</p:sld>
+</file>
+
+<file path=ppt/slides/slide34.xml><?xml version="1.0" encoding="utf-8"?>
+<p:sld xmlns:a="http://schemas.openxmlformats.org/drawingml/2006/main" xmlns:r="http://schemas.openxmlformats.org/officeDocument/2006/relationships" xmlns:p="http://schemas.openxmlformats.org/presentationml/2006/main">
+  <p:cSld>
+    <p:spTree>
+      <p:nvGrpSpPr>
+        <p:cNvPr id="1" name=""/>
+        <p:cNvGrpSpPr/>
+        <p:nvPr/>
+      </p:nvGrpSpPr>
+      <p:grpSpPr>
+        <a:xfrm>
+          <a:off x="0" y="0"/>
+          <a:ext cx="0" cy="0"/>
+          <a:chOff x="0" y="0"/>
+          <a:chExt cx="0" cy="0"/>
+        </a:xfrm>
+      </p:grpSpPr>
+      <p:sp>
+        <p:nvSpPr>
+          <p:cNvPr id="6" name="Title 5">
+            <a:extLst>
+              <a:ext uri="{FF2B5EF4-FFF2-40B4-BE49-F238E27FC236}">
+                <a16:creationId xmlns:a16="http://schemas.microsoft.com/office/drawing/2014/main" id="{E7BF15BD-001C-49B3-9A01-B39DEDA47564}"/>
+              </a:ext>
+            </a:extLst>
+          </p:cNvPr>
+          <p:cNvSpPr>
+            <a:spLocks noGrp="1"/>
+          </p:cNvSpPr>
+          <p:nvPr>
+            <p:ph type="title"/>
+          </p:nvPr>
+        </p:nvSpPr>
+        <p:spPr>
+          <a:xfrm>
+            <a:off x="314324" y="190500"/>
+            <a:ext cx="11801475" cy="498598"/>
+          </a:xfrm>
+        </p:spPr>
+        <p:txBody>
+          <a:bodyPr/>
+          <a:lstStyle/>
+          <a:p>
+            <a:r>
+              <a:rPr lang="en-US" dirty="0"/>
+              <a:t>Summary</a:t>
+            </a:r>
+          </a:p>
+        </p:txBody>
+      </p:sp>
+      <p:sp>
+        <p:nvSpPr>
+          <p:cNvPr id="2" name="Text Placeholder 1">
+            <a:extLst>
+              <a:ext uri="{FF2B5EF4-FFF2-40B4-BE49-F238E27FC236}">
+                <a16:creationId xmlns:a16="http://schemas.microsoft.com/office/drawing/2014/main" id="{A0A8A0CE-A7DF-4549-ABC9-3E2EC64106BC}"/>
+              </a:ext>
+            </a:extLst>
+          </p:cNvPr>
+          <p:cNvSpPr>
+            <a:spLocks noGrp="1"/>
+          </p:cNvSpPr>
+          <p:nvPr>
+            <p:ph type="body" sz="quarter" idx="10"/>
+          </p:nvPr>
+        </p:nvSpPr>
+        <p:spPr>
+          <a:xfrm>
+            <a:off x="511277" y="1227439"/>
+            <a:ext cx="11604521" cy="5693866"/>
+          </a:xfrm>
+        </p:spPr>
+        <p:txBody>
+          <a:bodyPr/>
+          <a:lstStyle/>
+          <a:p>
+            <a:pPr>
+              <a:buFont typeface="Wingdings" panose="05000000000000000000" pitchFamily="2" charset="2"/>
+              <a:buChar char="ü"/>
+            </a:pPr>
+            <a:r>
+              <a:rPr lang="en-US" dirty="0"/>
+              <a:t>Introduction to the Power BI Admin APIs</a:t>
+            </a:r>
+          </a:p>
+          <a:p>
+            <a:pPr>
+              <a:buFont typeface="Wingdings" panose="05000000000000000000" pitchFamily="2" charset="2"/>
+              <a:buChar char="ü"/>
+            </a:pPr>
+            <a:r>
+              <a:rPr lang="en-US" dirty="0"/>
+              <a:t>Discovering Workspaces and Artifacts</a:t>
+            </a:r>
+          </a:p>
+          <a:p>
+            <a:pPr>
+              <a:buFont typeface="Wingdings" panose="05000000000000000000" pitchFamily="2" charset="2"/>
+              <a:buChar char="ü"/>
+            </a:pPr>
+            <a:r>
+              <a:rPr lang="en-US" dirty="0"/>
+              <a:t>Enforcing Governance</a:t>
+            </a:r>
+          </a:p>
+          <a:p>
+            <a:pPr>
+              <a:buFont typeface="Wingdings" panose="05000000000000000000" pitchFamily="2" charset="2"/>
+              <a:buChar char="ü"/>
+            </a:pPr>
+            <a:r>
+              <a:rPr lang="en-US" dirty="0"/>
+              <a:t>Scanning Workspaces</a:t>
+            </a:r>
+          </a:p>
+          <a:p>
+            <a:pPr>
+              <a:buFont typeface="Wingdings" panose="05000000000000000000" pitchFamily="2" charset="2"/>
+              <a:buChar char="ü"/>
+            </a:pPr>
+            <a:r>
+              <a:rPr lang="en-US" dirty="0"/>
+              <a:t>Extracting Activity Events</a:t>
+            </a:r>
+          </a:p>
+          <a:p>
+            <a:pPr>
+              <a:buFont typeface="Wingdings" panose="05000000000000000000" pitchFamily="2" charset="2"/>
+              <a:buChar char="ü"/>
+            </a:pPr>
+            <a:r>
+              <a:rPr lang="en-US" dirty="0"/>
+              <a:t>Power BI Admin API Roadmap</a:t>
+            </a:r>
+          </a:p>
+          <a:p>
+            <a:pPr>
+              <a:buFont typeface="Wingdings" panose="05000000000000000000" pitchFamily="2" charset="2"/>
+              <a:buChar char="ü"/>
+            </a:pPr>
+            <a:endParaRPr lang="en-US" dirty="0"/>
+          </a:p>
+          <a:p>
+            <a:pPr>
+              <a:buFont typeface="Wingdings" panose="05000000000000000000" pitchFamily="2" charset="2"/>
+              <a:buChar char="ü"/>
+            </a:pPr>
+            <a:endParaRPr lang="en-US" dirty="0"/>
+          </a:p>
+          <a:p>
+            <a:pPr>
+              <a:buFont typeface="Wingdings" panose="05000000000000000000" pitchFamily="2" charset="2"/>
+              <a:buChar char="ü"/>
+            </a:pPr>
+            <a:endParaRPr lang="en-US" dirty="0"/>
+          </a:p>
+          <a:p>
+            <a:pPr lvl="1">
+              <a:buFont typeface="Wingdings" panose="05000000000000000000" pitchFamily="2" charset="2"/>
+              <a:buChar char="Ø"/>
+            </a:pPr>
+            <a:endParaRPr lang="en-US" dirty="0"/>
+          </a:p>
+          <a:p>
+            <a:pPr lvl="1">
+              <a:buFont typeface="Wingdings" panose="05000000000000000000" pitchFamily="2" charset="2"/>
+              <a:buChar char="Ø"/>
+            </a:pPr>
+            <a:endParaRPr lang="en-US" dirty="0"/>
+          </a:p>
+        </p:txBody>
+      </p:sp>
+    </p:spTree>
+    <p:extLst>
+      <p:ext uri="{BB962C8B-B14F-4D97-AF65-F5344CB8AC3E}">
+        <p14:creationId xmlns:p14="http://schemas.microsoft.com/office/powerpoint/2010/main" val="2175039357"/>
+      </p:ext>
+    </p:extLst>
+  </p:cSld>
+  <p:clrMapOvr>
+    <a:masterClrMapping/>
+  </p:clrMapOvr>
+  <mc:AlternateContent xmlns:mc="http://schemas.openxmlformats.org/markup-compatibility/2006" xmlns:p14="http://schemas.microsoft.com/office/powerpoint/2010/main">
+    <mc:Choice Requires="p14">
+      <p:transition p14:dur="0"/>
+    </mc:Choice>
+    <mc:Fallback xmlns="">
+      <p:transition/>
+    </mc:Fallback>
+  </mc:AlternateContent>
+</p:sld>
+</file>
+
+<file path=ppt/slides/slide35.xml><?xml version="1.0" encoding="utf-8"?>
 <p:sld xmlns:a="http://schemas.openxmlformats.org/drawingml/2006/main" xmlns:r="http://schemas.openxmlformats.org/officeDocument/2006/relationships" xmlns:p="http://schemas.openxmlformats.org/presentationml/2006/main">
   <p:cSld>
     <p:bg>
@@ -4356,6 +7355,841 @@
       </p:transition>
     </mc:Fallback>
   </mc:AlternateContent>
+</p:sld>
+</file>
+
+<file path=ppt/slides/slide4.xml><?xml version="1.0" encoding="utf-8"?>
+<p:sld xmlns:a="http://schemas.openxmlformats.org/drawingml/2006/main" xmlns:r="http://schemas.openxmlformats.org/officeDocument/2006/relationships" xmlns:p="http://schemas.openxmlformats.org/presentationml/2006/main">
+  <p:cSld>
+    <p:spTree>
+      <p:nvGrpSpPr>
+        <p:cNvPr id="1" name=""/>
+        <p:cNvGrpSpPr/>
+        <p:nvPr/>
+      </p:nvGrpSpPr>
+      <p:grpSpPr>
+        <a:xfrm>
+          <a:off x="0" y="0"/>
+          <a:ext cx="0" cy="0"/>
+          <a:chOff x="0" y="0"/>
+          <a:chExt cx="0" cy="0"/>
+        </a:xfrm>
+      </p:grpSpPr>
+      <p:sp>
+        <p:nvSpPr>
+          <p:cNvPr id="6" name="Title 5">
+            <a:extLst>
+              <a:ext uri="{FF2B5EF4-FFF2-40B4-BE49-F238E27FC236}">
+                <a16:creationId xmlns:a16="http://schemas.microsoft.com/office/drawing/2014/main" id="{E7BF15BD-001C-49B3-9A01-B39DEDA47564}"/>
+              </a:ext>
+            </a:extLst>
+          </p:cNvPr>
+          <p:cNvSpPr>
+            <a:spLocks noGrp="1"/>
+          </p:cNvSpPr>
+          <p:nvPr>
+            <p:ph type="title"/>
+          </p:nvPr>
+        </p:nvSpPr>
+        <p:spPr>
+          <a:xfrm>
+            <a:off x="314324" y="190500"/>
+            <a:ext cx="11801475" cy="498598"/>
+          </a:xfrm>
+        </p:spPr>
+        <p:txBody>
+          <a:bodyPr/>
+          <a:lstStyle/>
+          <a:p>
+            <a:r>
+              <a:rPr lang="en-US" dirty="0"/>
+              <a:t>Agenda</a:t>
+            </a:r>
+          </a:p>
+        </p:txBody>
+      </p:sp>
+      <p:sp>
+        <p:nvSpPr>
+          <p:cNvPr id="2" name="Text Placeholder 1">
+            <a:extLst>
+              <a:ext uri="{FF2B5EF4-FFF2-40B4-BE49-F238E27FC236}">
+                <a16:creationId xmlns:a16="http://schemas.microsoft.com/office/drawing/2014/main" id="{A0A8A0CE-A7DF-4549-ABC9-3E2EC64106BC}"/>
+              </a:ext>
+            </a:extLst>
+          </p:cNvPr>
+          <p:cNvSpPr>
+            <a:spLocks noGrp="1"/>
+          </p:cNvSpPr>
+          <p:nvPr>
+            <p:ph type="body" sz="quarter" idx="10"/>
+          </p:nvPr>
+        </p:nvSpPr>
+        <p:spPr>
+          <a:xfrm>
+            <a:off x="511277" y="1227439"/>
+            <a:ext cx="11604521" cy="4054956"/>
+          </a:xfrm>
+        </p:spPr>
+        <p:txBody>
+          <a:bodyPr/>
+          <a:lstStyle/>
+          <a:p>
+            <a:r>
+              <a:rPr lang="en-US" dirty="0"/>
+              <a:t>Introduction to the Power BI Admin APIs</a:t>
+            </a:r>
+          </a:p>
+          <a:p>
+            <a:r>
+              <a:rPr lang="en-US" dirty="0"/>
+              <a:t>Discovering Workspaces and Artifacts</a:t>
+            </a:r>
+          </a:p>
+          <a:p>
+            <a:r>
+              <a:rPr lang="en-US" dirty="0"/>
+              <a:t>Enforcing Governance</a:t>
+            </a:r>
+          </a:p>
+          <a:p>
+            <a:r>
+              <a:rPr lang="en-US" dirty="0"/>
+              <a:t>Scanning Workspaces</a:t>
+            </a:r>
+          </a:p>
+          <a:p>
+            <a:r>
+              <a:rPr lang="en-US" dirty="0"/>
+              <a:t>Extracting Activity Events</a:t>
+            </a:r>
+          </a:p>
+          <a:p>
+            <a:r>
+              <a:rPr lang="en-US" dirty="0"/>
+              <a:t>Power BI Admin API Roadmap</a:t>
+            </a:r>
+          </a:p>
+          <a:p>
+            <a:pPr lvl="1">
+              <a:buFont typeface="Wingdings" panose="05000000000000000000" pitchFamily="2" charset="2"/>
+              <a:buChar char="Ø"/>
+            </a:pPr>
+            <a:endParaRPr lang="en-US" dirty="0"/>
+          </a:p>
+          <a:p>
+            <a:pPr lvl="1">
+              <a:buFont typeface="Wingdings" panose="05000000000000000000" pitchFamily="2" charset="2"/>
+              <a:buChar char="Ø"/>
+            </a:pPr>
+            <a:endParaRPr lang="en-US" dirty="0"/>
+          </a:p>
+        </p:txBody>
+      </p:sp>
+    </p:spTree>
+    <p:extLst>
+      <p:ext uri="{BB962C8B-B14F-4D97-AF65-F5344CB8AC3E}">
+        <p14:creationId xmlns:p14="http://schemas.microsoft.com/office/powerpoint/2010/main" val="376308599"/>
+      </p:ext>
+    </p:extLst>
+  </p:cSld>
+  <p:clrMapOvr>
+    <a:masterClrMapping/>
+  </p:clrMapOvr>
+  <mc:AlternateContent xmlns:mc="http://schemas.openxmlformats.org/markup-compatibility/2006" xmlns:p14="http://schemas.microsoft.com/office/powerpoint/2010/main">
+    <mc:Choice Requires="p14">
+      <p:transition p14:dur="0"/>
+    </mc:Choice>
+    <mc:Fallback xmlns="">
+      <p:transition/>
+    </mc:Fallback>
+  </mc:AlternateContent>
+</p:sld>
+</file>
+
+<file path=ppt/slides/slide5.xml><?xml version="1.0" encoding="utf-8"?>
+<p:sld xmlns:a="http://schemas.openxmlformats.org/drawingml/2006/main" xmlns:r="http://schemas.openxmlformats.org/officeDocument/2006/relationships" xmlns:p="http://schemas.openxmlformats.org/presentationml/2006/main">
+  <p:cSld>
+    <p:spTree>
+      <p:nvGrpSpPr>
+        <p:cNvPr id="1" name=""/>
+        <p:cNvGrpSpPr/>
+        <p:nvPr/>
+      </p:nvGrpSpPr>
+      <p:grpSpPr>
+        <a:xfrm>
+          <a:off x="0" y="0"/>
+          <a:ext cx="0" cy="0"/>
+          <a:chOff x="0" y="0"/>
+          <a:chExt cx="0" cy="0"/>
+        </a:xfrm>
+      </p:grpSpPr>
+      <p:sp>
+        <p:nvSpPr>
+          <p:cNvPr id="2" name="Title 1">
+            <a:extLst>
+              <a:ext uri="{FF2B5EF4-FFF2-40B4-BE49-F238E27FC236}">
+                <a16:creationId xmlns:a16="http://schemas.microsoft.com/office/drawing/2014/main" id="{FFD5BEA1-2B46-4B0D-B4BA-9FA933995E06}"/>
+              </a:ext>
+            </a:extLst>
+          </p:cNvPr>
+          <p:cNvSpPr>
+            <a:spLocks noGrp="1"/>
+          </p:cNvSpPr>
+          <p:nvPr>
+            <p:ph type="title"/>
+          </p:nvPr>
+        </p:nvSpPr>
+        <p:spPr/>
+        <p:txBody>
+          <a:bodyPr/>
+          <a:lstStyle/>
+          <a:p>
+            <a:r>
+              <a:rPr lang="en-US" dirty="0">
+                <a:solidFill>
+                  <a:srgbClr val="FF0000"/>
+                </a:solidFill>
+              </a:rPr>
+              <a:t>PLACEHOLDER – Rick’s intro section</a:t>
+            </a:r>
+          </a:p>
+        </p:txBody>
+      </p:sp>
+      <p:sp>
+        <p:nvSpPr>
+          <p:cNvPr id="3" name="Text Placeholder 2">
+            <a:extLst>
+              <a:ext uri="{FF2B5EF4-FFF2-40B4-BE49-F238E27FC236}">
+                <a16:creationId xmlns:a16="http://schemas.microsoft.com/office/drawing/2014/main" id="{6533E791-AA8A-42B3-9C84-E51451ACA932}"/>
+              </a:ext>
+            </a:extLst>
+          </p:cNvPr>
+          <p:cNvSpPr>
+            <a:spLocks noGrp="1"/>
+          </p:cNvSpPr>
+          <p:nvPr>
+            <p:ph type="body" sz="quarter" idx="10"/>
+          </p:nvPr>
+        </p:nvSpPr>
+        <p:spPr/>
+        <p:txBody>
+          <a:bodyPr/>
+          <a:lstStyle/>
+          <a:p>
+            <a:endParaRPr lang="en-US"/>
+          </a:p>
+        </p:txBody>
+      </p:sp>
+    </p:spTree>
+    <p:extLst>
+      <p:ext uri="{BB962C8B-B14F-4D97-AF65-F5344CB8AC3E}">
+        <p14:creationId xmlns:p14="http://schemas.microsoft.com/office/powerpoint/2010/main" val="3118508905"/>
+      </p:ext>
+    </p:extLst>
+  </p:cSld>
+  <p:clrMapOvr>
+    <a:masterClrMapping/>
+  </p:clrMapOvr>
+  <p:transition>
+    <p:fade/>
+  </p:transition>
+</p:sld>
+</file>
+
+<file path=ppt/slides/slide6.xml><?xml version="1.0" encoding="utf-8"?>
+<p:sld xmlns:a="http://schemas.openxmlformats.org/drawingml/2006/main" xmlns:r="http://schemas.openxmlformats.org/officeDocument/2006/relationships" xmlns:p="http://schemas.openxmlformats.org/presentationml/2006/main">
+  <p:cSld>
+    <p:spTree>
+      <p:nvGrpSpPr>
+        <p:cNvPr id="1" name=""/>
+        <p:cNvGrpSpPr/>
+        <p:nvPr/>
+      </p:nvGrpSpPr>
+      <p:grpSpPr>
+        <a:xfrm>
+          <a:off x="0" y="0"/>
+          <a:ext cx="0" cy="0"/>
+          <a:chOff x="0" y="0"/>
+          <a:chExt cx="0" cy="0"/>
+        </a:xfrm>
+      </p:grpSpPr>
+      <p:sp>
+        <p:nvSpPr>
+          <p:cNvPr id="2" name="Title 1">
+            <a:extLst>
+              <a:ext uri="{FF2B5EF4-FFF2-40B4-BE49-F238E27FC236}">
+                <a16:creationId xmlns:a16="http://schemas.microsoft.com/office/drawing/2014/main" id="{DFE4DA5F-5C0E-438E-8C8B-47F52D744D7A}"/>
+              </a:ext>
+            </a:extLst>
+          </p:cNvPr>
+          <p:cNvSpPr>
+            <a:spLocks noGrp="1"/>
+          </p:cNvSpPr>
+          <p:nvPr>
+            <p:ph type="title"/>
+          </p:nvPr>
+        </p:nvSpPr>
+        <p:spPr/>
+        <p:txBody>
+          <a:bodyPr/>
+          <a:lstStyle/>
+          <a:p>
+            <a:r>
+              <a:rPr lang="en-US" dirty="0"/>
+              <a:t>Power BI Admin API Permissions</a:t>
+            </a:r>
+          </a:p>
+        </p:txBody>
+      </p:sp>
+      <p:sp>
+        <p:nvSpPr>
+          <p:cNvPr id="3" name="Text Placeholder 2">
+            <a:extLst>
+              <a:ext uri="{FF2B5EF4-FFF2-40B4-BE49-F238E27FC236}">
+                <a16:creationId xmlns:a16="http://schemas.microsoft.com/office/drawing/2014/main" id="{8D003F20-5B72-47A9-A013-2F56C9E7111F}"/>
+              </a:ext>
+            </a:extLst>
+          </p:cNvPr>
+          <p:cNvSpPr>
+            <a:spLocks noGrp="1"/>
+          </p:cNvSpPr>
+          <p:nvPr>
+            <p:ph type="body" sz="quarter" idx="10"/>
+          </p:nvPr>
+        </p:nvSpPr>
+        <p:spPr>
+          <a:xfrm>
+            <a:off x="511277" y="1227439"/>
+            <a:ext cx="11604521" cy="3770263"/>
+          </a:xfrm>
+        </p:spPr>
+        <p:txBody>
+          <a:bodyPr/>
+          <a:lstStyle/>
+          <a:p>
+            <a:r>
+              <a:rPr lang="en-US" dirty="0"/>
+              <a:t>For users</a:t>
+            </a:r>
+          </a:p>
+          <a:p>
+            <a:pPr lvl="1"/>
+            <a:r>
+              <a:rPr lang="en-US" dirty="0"/>
+              <a:t>Allows read/write access</a:t>
+            </a:r>
+          </a:p>
+          <a:p>
+            <a:pPr lvl="1"/>
+            <a:r>
+              <a:rPr lang="en-US" dirty="0"/>
+              <a:t>Azure AD user account must be configured as Power BI Administrator</a:t>
+            </a:r>
+          </a:p>
+          <a:p>
+            <a:pPr lvl="1"/>
+            <a:r>
+              <a:rPr lang="en-US" dirty="0"/>
+              <a:t>Azure AD global tenant admin considers as a Power BI Administrator</a:t>
+            </a:r>
+          </a:p>
+          <a:p>
+            <a:pPr>
+              <a:spcBef>
+                <a:spcPts val="1200"/>
+              </a:spcBef>
+            </a:pPr>
+            <a:r>
+              <a:rPr lang="en-US" dirty="0"/>
+              <a:t>For service principals</a:t>
+            </a:r>
+          </a:p>
+          <a:p>
+            <a:pPr lvl="1"/>
+            <a:r>
+              <a:rPr lang="en-US" dirty="0"/>
+              <a:t>Allows read-only access</a:t>
+            </a:r>
+          </a:p>
+          <a:p>
+            <a:pPr lvl="1"/>
+            <a:r>
+              <a:rPr lang="en-US" dirty="0"/>
+              <a:t>Requires configuring tenant settings in Power BI Admin portal</a:t>
+            </a:r>
+          </a:p>
+          <a:p>
+            <a:pPr lvl="1"/>
+            <a:endParaRPr lang="en-US" dirty="0"/>
+          </a:p>
+        </p:txBody>
+      </p:sp>
+    </p:spTree>
+    <p:extLst>
+      <p:ext uri="{BB962C8B-B14F-4D97-AF65-F5344CB8AC3E}">
+        <p14:creationId xmlns:p14="http://schemas.microsoft.com/office/powerpoint/2010/main" val="1322220317"/>
+      </p:ext>
+    </p:extLst>
+  </p:cSld>
+  <p:clrMapOvr>
+    <a:masterClrMapping/>
+  </p:clrMapOvr>
+  <p:transition>
+    <p:fade/>
+  </p:transition>
+</p:sld>
+</file>
+
+<file path=ppt/slides/slide7.xml><?xml version="1.0" encoding="utf-8"?>
+<p:sld xmlns:a="http://schemas.openxmlformats.org/drawingml/2006/main" xmlns:r="http://schemas.openxmlformats.org/officeDocument/2006/relationships" xmlns:p="http://schemas.openxmlformats.org/presentationml/2006/main">
+  <p:cSld>
+    <p:spTree>
+      <p:nvGrpSpPr>
+        <p:cNvPr id="1" name=""/>
+        <p:cNvGrpSpPr/>
+        <p:nvPr/>
+      </p:nvGrpSpPr>
+      <p:grpSpPr>
+        <a:xfrm>
+          <a:off x="0" y="0"/>
+          <a:ext cx="0" cy="0"/>
+          <a:chOff x="0" y="0"/>
+          <a:chExt cx="0" cy="0"/>
+        </a:xfrm>
+      </p:grpSpPr>
+      <p:sp>
+        <p:nvSpPr>
+          <p:cNvPr id="2" name="Title 1">
+            <a:extLst>
+              <a:ext uri="{FF2B5EF4-FFF2-40B4-BE49-F238E27FC236}">
+                <a16:creationId xmlns:a16="http://schemas.microsoft.com/office/drawing/2014/main" id="{4B22AABB-B1E6-4182-AAEB-4AB6B7648028}"/>
+              </a:ext>
+            </a:extLst>
+          </p:cNvPr>
+          <p:cNvSpPr>
+            <a:spLocks noGrp="1"/>
+          </p:cNvSpPr>
+          <p:nvPr>
+            <p:ph type="title"/>
+          </p:nvPr>
+        </p:nvSpPr>
+        <p:spPr/>
+        <p:txBody>
+          <a:bodyPr/>
+          <a:lstStyle/>
+          <a:p>
+            <a:r>
+              <a:rPr lang="en-US" dirty="0"/>
+              <a:t>Ways to Call API</a:t>
+            </a:r>
+          </a:p>
+        </p:txBody>
+      </p:sp>
+      <p:sp>
+        <p:nvSpPr>
+          <p:cNvPr id="3" name="Text Placeholder 2">
+            <a:extLst>
+              <a:ext uri="{FF2B5EF4-FFF2-40B4-BE49-F238E27FC236}">
+                <a16:creationId xmlns:a16="http://schemas.microsoft.com/office/drawing/2014/main" id="{A1A3D0A1-4FD4-4D9A-9D7D-5DBED26F0AA9}"/>
+              </a:ext>
+            </a:extLst>
+          </p:cNvPr>
+          <p:cNvSpPr>
+            <a:spLocks noGrp="1"/>
+          </p:cNvSpPr>
+          <p:nvPr>
+            <p:ph type="body" sz="quarter" idx="10"/>
+          </p:nvPr>
+        </p:nvSpPr>
+        <p:spPr>
+          <a:xfrm>
+            <a:off x="511277" y="1227439"/>
+            <a:ext cx="11604521" cy="5247590"/>
+          </a:xfrm>
+        </p:spPr>
+        <p:txBody>
+          <a:bodyPr/>
+          <a:lstStyle/>
+          <a:p>
+            <a:r>
+              <a:rPr lang="en-US" dirty="0"/>
+              <a:t>Direct call to Power BI REST API</a:t>
+            </a:r>
+          </a:p>
+          <a:p>
+            <a:pPr lvl="1"/>
+            <a:r>
+              <a:rPr lang="en-US" dirty="0"/>
+              <a:t>Open standards allow calling this API from any web development platform</a:t>
+            </a:r>
+          </a:p>
+          <a:p>
+            <a:pPr lvl="1"/>
+            <a:r>
+              <a:rPr lang="en-US" dirty="0"/>
+              <a:t>See documentation: </a:t>
+            </a:r>
+            <a:r>
+              <a:rPr lang="en-US" dirty="0">
+                <a:hlinkClick r:id="rId2"/>
+              </a:rPr>
+              <a:t>https://docs.microsoft.com/en-us/rest/api/power-bi/</a:t>
+            </a:r>
+            <a:r>
+              <a:rPr lang="en-US" dirty="0"/>
+              <a:t> </a:t>
+            </a:r>
+          </a:p>
+          <a:p>
+            <a:pPr>
+              <a:spcBef>
+                <a:spcPts val="1200"/>
+              </a:spcBef>
+            </a:pPr>
+            <a:r>
+              <a:rPr lang="en-US" dirty="0"/>
+              <a:t>C# using the Power BI .NET SDK</a:t>
+            </a:r>
+          </a:p>
+          <a:p>
+            <a:pPr lvl="1"/>
+            <a:r>
+              <a:rPr lang="en-US" dirty="0"/>
+              <a:t>Simple console application</a:t>
+            </a:r>
+          </a:p>
+          <a:p>
+            <a:pPr lvl="1"/>
+            <a:r>
+              <a:rPr lang="en-US" dirty="0"/>
+              <a:t>Azure functions</a:t>
+            </a:r>
+          </a:p>
+          <a:p>
+            <a:pPr>
+              <a:spcBef>
+                <a:spcPts val="1200"/>
+              </a:spcBef>
+            </a:pPr>
+            <a:r>
+              <a:rPr lang="en-US" dirty="0"/>
+              <a:t>From PowerShell using Power BI </a:t>
+            </a:r>
+            <a:r>
+              <a:rPr lang="en-US" dirty="0" err="1"/>
+              <a:t>Mgmt</a:t>
+            </a:r>
+            <a:r>
+              <a:rPr lang="en-US" dirty="0"/>
+              <a:t> </a:t>
+            </a:r>
+            <a:r>
+              <a:rPr lang="en-US" dirty="0" err="1"/>
+              <a:t>Commandlets</a:t>
+            </a:r>
+            <a:endParaRPr lang="en-US" dirty="0"/>
+          </a:p>
+          <a:p>
+            <a:pPr lvl="1"/>
+            <a:r>
+              <a:rPr lang="en-US" dirty="0"/>
+              <a:t>Makes it easy for administrators to modify and execute scripts </a:t>
+            </a:r>
+          </a:p>
+          <a:p>
+            <a:pPr lvl="1"/>
+            <a:r>
+              <a:rPr lang="en-US" dirty="0"/>
+              <a:t>Azure functions</a:t>
+            </a:r>
+          </a:p>
+          <a:p>
+            <a:pPr>
+              <a:spcBef>
+                <a:spcPts val="1200"/>
+              </a:spcBef>
+            </a:pPr>
+            <a:r>
+              <a:rPr lang="en-US" dirty="0"/>
+              <a:t>From Power Automate</a:t>
+            </a:r>
+          </a:p>
+          <a:p>
+            <a:pPr lvl="1"/>
+            <a:r>
+              <a:rPr lang="en-US" dirty="0"/>
+              <a:t>Calls Power BI Admin APIs directly from flow</a:t>
+            </a:r>
+          </a:p>
+          <a:p>
+            <a:pPr lvl="1"/>
+            <a:r>
+              <a:rPr lang="en-US" dirty="0"/>
+              <a:t>See Dec 2021 session of Power BI Dev Camp for more info</a:t>
+            </a:r>
+          </a:p>
+        </p:txBody>
+      </p:sp>
+    </p:spTree>
+    <p:extLst>
+      <p:ext uri="{BB962C8B-B14F-4D97-AF65-F5344CB8AC3E}">
+        <p14:creationId xmlns:p14="http://schemas.microsoft.com/office/powerpoint/2010/main" val="1510109889"/>
+      </p:ext>
+    </p:extLst>
+  </p:cSld>
+  <p:clrMapOvr>
+    <a:masterClrMapping/>
+  </p:clrMapOvr>
+  <p:transition>
+    <p:fade/>
+  </p:transition>
+</p:sld>
+</file>
+
+<file path=ppt/slides/slide8.xml><?xml version="1.0" encoding="utf-8"?>
+<p:sld xmlns:a="http://schemas.openxmlformats.org/drawingml/2006/main" xmlns:r="http://schemas.openxmlformats.org/officeDocument/2006/relationships" xmlns:p="http://schemas.openxmlformats.org/presentationml/2006/main">
+  <p:cSld>
+    <p:spTree>
+      <p:nvGrpSpPr>
+        <p:cNvPr id="1" name=""/>
+        <p:cNvGrpSpPr/>
+        <p:nvPr/>
+      </p:nvGrpSpPr>
+      <p:grpSpPr>
+        <a:xfrm>
+          <a:off x="0" y="0"/>
+          <a:ext cx="0" cy="0"/>
+          <a:chOff x="0" y="0"/>
+          <a:chExt cx="0" cy="0"/>
+        </a:xfrm>
+      </p:grpSpPr>
+      <p:sp>
+        <p:nvSpPr>
+          <p:cNvPr id="6" name="Title 5">
+            <a:extLst>
+              <a:ext uri="{FF2B5EF4-FFF2-40B4-BE49-F238E27FC236}">
+                <a16:creationId xmlns:a16="http://schemas.microsoft.com/office/drawing/2014/main" id="{E7BF15BD-001C-49B3-9A01-B39DEDA47564}"/>
+              </a:ext>
+            </a:extLst>
+          </p:cNvPr>
+          <p:cNvSpPr>
+            <a:spLocks noGrp="1"/>
+          </p:cNvSpPr>
+          <p:nvPr>
+            <p:ph type="title"/>
+          </p:nvPr>
+        </p:nvSpPr>
+        <p:spPr>
+          <a:xfrm>
+            <a:off x="314324" y="190500"/>
+            <a:ext cx="11801475" cy="498598"/>
+          </a:xfrm>
+        </p:spPr>
+        <p:txBody>
+          <a:bodyPr/>
+          <a:lstStyle/>
+          <a:p>
+            <a:r>
+              <a:rPr lang="en-US" dirty="0"/>
+              <a:t>Agenda</a:t>
+            </a:r>
+          </a:p>
+        </p:txBody>
+      </p:sp>
+      <p:sp>
+        <p:nvSpPr>
+          <p:cNvPr id="2" name="Text Placeholder 1">
+            <a:extLst>
+              <a:ext uri="{FF2B5EF4-FFF2-40B4-BE49-F238E27FC236}">
+                <a16:creationId xmlns:a16="http://schemas.microsoft.com/office/drawing/2014/main" id="{A0A8A0CE-A7DF-4549-ABC9-3E2EC64106BC}"/>
+              </a:ext>
+            </a:extLst>
+          </p:cNvPr>
+          <p:cNvSpPr>
+            <a:spLocks noGrp="1"/>
+          </p:cNvSpPr>
+          <p:nvPr>
+            <p:ph type="body" sz="quarter" idx="10"/>
+          </p:nvPr>
+        </p:nvSpPr>
+        <p:spPr>
+          <a:xfrm>
+            <a:off x="511277" y="1227439"/>
+            <a:ext cx="11604521" cy="4054956"/>
+          </a:xfrm>
+        </p:spPr>
+        <p:txBody>
+          <a:bodyPr/>
+          <a:lstStyle/>
+          <a:p>
+            <a:pPr>
+              <a:buFont typeface="Wingdings" panose="05000000000000000000" pitchFamily="2" charset="2"/>
+              <a:buChar char="ü"/>
+            </a:pPr>
+            <a:r>
+              <a:rPr lang="en-US" dirty="0"/>
+              <a:t>Introduction to the Power BI Admin APIs</a:t>
+            </a:r>
+          </a:p>
+          <a:p>
+            <a:pPr>
+              <a:buFont typeface="Wingdings" panose="05000000000000000000" pitchFamily="2" charset="2"/>
+              <a:buChar char="Ø"/>
+            </a:pPr>
+            <a:r>
+              <a:rPr lang="en-US" dirty="0"/>
+              <a:t>Discovering Workspaces and Artifacts</a:t>
+            </a:r>
+          </a:p>
+          <a:p>
+            <a:r>
+              <a:rPr lang="en-US" dirty="0"/>
+              <a:t>Enforcing Governance</a:t>
+            </a:r>
+          </a:p>
+          <a:p>
+            <a:r>
+              <a:rPr lang="en-US" dirty="0"/>
+              <a:t>Scanning Workspaces</a:t>
+            </a:r>
+          </a:p>
+          <a:p>
+            <a:r>
+              <a:rPr lang="en-US" dirty="0"/>
+              <a:t>Extracting Activity Events</a:t>
+            </a:r>
+          </a:p>
+          <a:p>
+            <a:r>
+              <a:rPr lang="en-US" dirty="0"/>
+              <a:t>Power BI Admin API Roadmap</a:t>
+            </a:r>
+          </a:p>
+          <a:p>
+            <a:pPr lvl="1">
+              <a:buFont typeface="Wingdings" panose="05000000000000000000" pitchFamily="2" charset="2"/>
+              <a:buChar char="Ø"/>
+            </a:pPr>
+            <a:endParaRPr lang="en-US" dirty="0"/>
+          </a:p>
+          <a:p>
+            <a:pPr lvl="1">
+              <a:buFont typeface="Wingdings" panose="05000000000000000000" pitchFamily="2" charset="2"/>
+              <a:buChar char="Ø"/>
+            </a:pPr>
+            <a:endParaRPr lang="en-US" dirty="0"/>
+          </a:p>
+        </p:txBody>
+      </p:sp>
+    </p:spTree>
+    <p:extLst>
+      <p:ext uri="{BB962C8B-B14F-4D97-AF65-F5344CB8AC3E}">
+        <p14:creationId xmlns:p14="http://schemas.microsoft.com/office/powerpoint/2010/main" val="693290967"/>
+      </p:ext>
+    </p:extLst>
+  </p:cSld>
+  <p:clrMapOvr>
+    <a:masterClrMapping/>
+  </p:clrMapOvr>
+  <mc:AlternateContent xmlns:mc="http://schemas.openxmlformats.org/markup-compatibility/2006" xmlns:p14="http://schemas.microsoft.com/office/powerpoint/2010/main">
+    <mc:Choice Requires="p14">
+      <p:transition p14:dur="0"/>
+    </mc:Choice>
+    <mc:Fallback xmlns="">
+      <p:transition/>
+    </mc:Fallback>
+  </mc:AlternateContent>
+</p:sld>
+</file>
+
+<file path=ppt/slides/slide9.xml><?xml version="1.0" encoding="utf-8"?>
+<p:sld xmlns:a="http://schemas.openxmlformats.org/drawingml/2006/main" xmlns:r="http://schemas.openxmlformats.org/officeDocument/2006/relationships" xmlns:p="http://schemas.openxmlformats.org/presentationml/2006/main">
+  <p:cSld>
+    <p:spTree>
+      <p:nvGrpSpPr>
+        <p:cNvPr id="1" name=""/>
+        <p:cNvGrpSpPr/>
+        <p:nvPr/>
+      </p:nvGrpSpPr>
+      <p:grpSpPr>
+        <a:xfrm>
+          <a:off x="0" y="0"/>
+          <a:ext cx="0" cy="0"/>
+          <a:chOff x="0" y="0"/>
+          <a:chExt cx="0" cy="0"/>
+        </a:xfrm>
+      </p:grpSpPr>
+      <p:sp>
+        <p:nvSpPr>
+          <p:cNvPr id="2" name="Title 1">
+            <a:extLst>
+              <a:ext uri="{FF2B5EF4-FFF2-40B4-BE49-F238E27FC236}">
+                <a16:creationId xmlns:a16="http://schemas.microsoft.com/office/drawing/2014/main" id="{B59FD68E-19A6-4528-B231-F0FF96A813B1}"/>
+              </a:ext>
+            </a:extLst>
+          </p:cNvPr>
+          <p:cNvSpPr>
+            <a:spLocks noGrp="1"/>
+          </p:cNvSpPr>
+          <p:nvPr>
+            <p:ph type="title"/>
+          </p:nvPr>
+        </p:nvSpPr>
+        <p:spPr/>
+        <p:txBody>
+          <a:bodyPr/>
+          <a:lstStyle/>
+          <a:p>
+            <a:r>
+              <a:rPr lang="en-US" dirty="0"/>
+              <a:t>Discovering Workspaces using </a:t>
+            </a:r>
+            <a:r>
+              <a:rPr lang="en-US" dirty="0" err="1"/>
+              <a:t>GetGroupsAsAdmin</a:t>
+            </a:r>
+            <a:endParaRPr lang="en-US" dirty="0"/>
+          </a:p>
+        </p:txBody>
+      </p:sp>
+      <p:sp>
+        <p:nvSpPr>
+          <p:cNvPr id="3" name="Text Placeholder 2">
+            <a:extLst>
+              <a:ext uri="{FF2B5EF4-FFF2-40B4-BE49-F238E27FC236}">
+                <a16:creationId xmlns:a16="http://schemas.microsoft.com/office/drawing/2014/main" id="{1F283276-8FEF-4E9F-8515-D83376D5804E}"/>
+              </a:ext>
+            </a:extLst>
+          </p:cNvPr>
+          <p:cNvSpPr>
+            <a:spLocks noGrp="1"/>
+          </p:cNvSpPr>
+          <p:nvPr>
+            <p:ph type="body" sz="quarter" idx="10"/>
+          </p:nvPr>
+        </p:nvSpPr>
+        <p:spPr/>
+        <p:txBody>
+          <a:bodyPr/>
+          <a:lstStyle/>
+          <a:p>
+            <a:endParaRPr lang="en-US"/>
+          </a:p>
+        </p:txBody>
+      </p:sp>
+    </p:spTree>
+    <p:extLst>
+      <p:ext uri="{BB962C8B-B14F-4D97-AF65-F5344CB8AC3E}">
+        <p14:creationId xmlns:p14="http://schemas.microsoft.com/office/powerpoint/2010/main" val="1002578535"/>
+      </p:ext>
+    </p:extLst>
+  </p:cSld>
+  <p:clrMapOvr>
+    <a:masterClrMapping/>
+  </p:clrMapOvr>
+  <p:transition>
+    <p:fade/>
+  </p:transition>
 </p:sld>
 </file>
 
@@ -5380,18 +9214,18 @@
 </file>
 
 <file path=customXml/item2.xml><?xml version="1.0" encoding="utf-8"?>
-<p:properties xmlns:p="http://schemas.microsoft.com/office/2006/metadata/properties" xmlns:xsi="http://www.w3.org/2001/XMLSchema-instance" xmlns:pc="http://schemas.microsoft.com/office/infopath/2007/PartnerControls">
-  <documentManagement/>
-</p:properties>
-</file>
-
-<file path=customXml/item3.xml><?xml version="1.0" encoding="utf-8"?>
 <?mso-contentType ?>
 <FormTemplates xmlns="http://schemas.microsoft.com/sharepoint/v3/contenttype/forms">
   <Display>DocumentLibraryForm</Display>
   <Edit>DocumentLibraryForm</Edit>
   <New>DocumentLibraryForm</New>
 </FormTemplates>
+</file>
+
+<file path=customXml/item3.xml><?xml version="1.0" encoding="utf-8"?>
+<p:properties xmlns:p="http://schemas.microsoft.com/office/2006/metadata/properties" xmlns:xsi="http://www.w3.org/2001/XMLSchema-instance" xmlns:pc="http://schemas.microsoft.com/office/infopath/2007/PartnerControls">
+  <documentManagement/>
+</p:properties>
 </file>
 
 <file path=customXml/itemProps1.xml><?xml version="1.0" encoding="utf-8"?>
@@ -5413,6 +9247,14 @@
 </file>
 
 <file path=customXml/itemProps2.xml><?xml version="1.0" encoding="utf-8"?>
+<ds:datastoreItem xmlns:ds="http://schemas.openxmlformats.org/officeDocument/2006/customXml" ds:itemID="{758FDAC0-319D-4A54-8D8E-1D42CB1F8004}">
+  <ds:schemaRefs>
+    <ds:schemaRef ds:uri="http://schemas.microsoft.com/sharepoint/v3/contenttype/forms"/>
+  </ds:schemaRefs>
+</ds:datastoreItem>
+</file>
+
+<file path=customXml/itemProps3.xml><?xml version="1.0" encoding="utf-8"?>
 <ds:datastoreItem xmlns:ds="http://schemas.openxmlformats.org/officeDocument/2006/customXml" ds:itemID="{F990F116-B58F-4255-B05B-DA3808E0E5C6}">
   <ds:schemaRefs>
     <ds:schemaRef ds:uri="http://www.w3.org/XML/1998/namespace"/>
@@ -5428,14 +9270,6 @@
 </ds:datastoreItem>
 </file>
 
-<file path=customXml/itemProps3.xml><?xml version="1.0" encoding="utf-8"?>
-<ds:datastoreItem xmlns:ds="http://schemas.openxmlformats.org/officeDocument/2006/customXml" ds:itemID="{758FDAC0-319D-4A54-8D8E-1D42CB1F8004}">
-  <ds:schemaRefs>
-    <ds:schemaRef ds:uri="http://schemas.microsoft.com/sharepoint/v3/contenttype/forms"/>
-  </ds:schemaRefs>
-</ds:datastoreItem>
-</file>
-
 <file path=docMetadata/LabelInfo.xml><?xml version="1.0" encoding="utf-8"?>
 <clbl:labelList xmlns:clbl="http://schemas.microsoft.com/office/2020/mipLabelMetadata">
   <clbl:label id="{074e257c-5848-4582-9a6f-34a182080e71}" enabled="1" method="Privileged" siteId="{72f988bf-86f1-41af-91ab-2d7cd011db47}" removed="0"/>

</xml_diff>